<commit_message>
PPT update, Add Script
</commit_message>
<xml_diff>
--- a/Forward Thinking KnockoutJS.pptx
+++ b/Forward Thinking KnockoutJS.pptx
@@ -5,10 +5,10 @@
     <p:sldMasterId id="2147483902" r:id="rId4"/>
   </p:sldMasterIdLst>
   <p:notesMasterIdLst>
-    <p:notesMasterId r:id="rId14"/>
+    <p:notesMasterId r:id="rId15"/>
   </p:notesMasterIdLst>
   <p:handoutMasterIdLst>
-    <p:handoutMasterId r:id="rId15"/>
+    <p:handoutMasterId r:id="rId16"/>
   </p:handoutMasterIdLst>
   <p:sldIdLst>
     <p:sldId id="275" r:id="rId5"/>
@@ -19,7 +19,8 @@
     <p:sldId id="282" r:id="rId10"/>
     <p:sldId id="267" r:id="rId11"/>
     <p:sldId id="283" r:id="rId12"/>
-    <p:sldId id="284" r:id="rId13"/>
+    <p:sldId id="285" r:id="rId13"/>
+    <p:sldId id="284" r:id="rId14"/>
   </p:sldIdLst>
   <p:sldSz cx="9144000" cy="5715000" type="screen16x10"/>
   <p:notesSz cx="6858000" cy="9144000"/>
@@ -4444,9 +4445,16 @@
   <p:cSld>
     <p:bg>
       <p:bgPr>
-        <a:solidFill>
-          <a:schemeClr val="bg1"/>
-        </a:solidFill>
+        <a:blipFill dpi="0" rotWithShape="1">
+          <a:blip r:embed="rId2">
+            <a:alphaModFix amt="60000"/>
+            <a:lum/>
+          </a:blip>
+          <a:srcRect/>
+          <a:stretch>
+            <a:fillRect/>
+          </a:stretch>
+        </a:blipFill>
         <a:effectLst/>
       </p:bgPr>
     </p:bg>
@@ -4557,6 +4565,101 @@
 </p:sld>
 </file>
 
+<file path=ppt/slides/slide10.xml><?xml version="1.0" encoding="utf-8"?>
+<p:sld xmlns:a="http://schemas.openxmlformats.org/drawingml/2006/main" xmlns:r="http://schemas.openxmlformats.org/officeDocument/2006/relationships" xmlns:p="http://schemas.openxmlformats.org/presentationml/2006/main">
+  <p:cSld>
+    <p:spTree>
+      <p:nvGrpSpPr>
+        <p:cNvPr id="1" name=""/>
+        <p:cNvGrpSpPr/>
+        <p:nvPr/>
+      </p:nvGrpSpPr>
+      <p:grpSpPr>
+        <a:xfrm>
+          <a:off x="0" y="0"/>
+          <a:ext cx="0" cy="0"/>
+          <a:chOff x="0" y="0"/>
+          <a:chExt cx="0" cy="0"/>
+        </a:xfrm>
+      </p:grpSpPr>
+      <p:sp>
+        <p:nvSpPr>
+          <p:cNvPr id="2" name="Title 1"/>
+          <p:cNvSpPr>
+            <a:spLocks noGrp="1"/>
+          </p:cNvSpPr>
+          <p:nvPr>
+            <p:ph type="title"/>
+          </p:nvPr>
+        </p:nvSpPr>
+        <p:spPr/>
+        <p:txBody>
+          <a:bodyPr/>
+          <a:lstStyle/>
+          <a:p>
+            <a:r>
+              <a:rPr lang="en-US" dirty="0" smtClean="0"/>
+              <a:t>Questions</a:t>
+            </a:r>
+            <a:endParaRPr lang="en-US" dirty="0"/>
+          </a:p>
+        </p:txBody>
+      </p:sp>
+      <p:sp>
+        <p:nvSpPr>
+          <p:cNvPr id="3" name="Text Placeholder 2"/>
+          <p:cNvSpPr>
+            <a:spLocks noGrp="1"/>
+          </p:cNvSpPr>
+          <p:nvPr>
+            <p:ph type="body" idx="1"/>
+          </p:nvPr>
+        </p:nvSpPr>
+        <p:spPr/>
+        <p:txBody>
+          <a:bodyPr/>
+          <a:lstStyle/>
+          <a:p>
+            <a:endParaRPr lang="en-US"/>
+          </a:p>
+        </p:txBody>
+      </p:sp>
+      <p:sp>
+        <p:nvSpPr>
+          <p:cNvPr id="4" name="Footer Placeholder 3"/>
+          <p:cNvSpPr>
+            <a:spLocks noGrp="1"/>
+          </p:cNvSpPr>
+          <p:nvPr>
+            <p:ph type="ftr" sz="quarter" idx="10"/>
+          </p:nvPr>
+        </p:nvSpPr>
+        <p:spPr/>
+        <p:txBody>
+          <a:bodyPr/>
+          <a:lstStyle/>
+          <a:p>
+            <a:r>
+              <a:rPr lang="en-US" smtClean="0"/>
+              <a:t>fast.  forward.  thinking.</a:t>
+            </a:r>
+            <a:endParaRPr lang="en-US" dirty="0"/>
+          </a:p>
+        </p:txBody>
+      </p:sp>
+    </p:spTree>
+    <p:extLst>
+      <p:ext uri="{BB962C8B-B14F-4D97-AF65-F5344CB8AC3E}">
+        <p14:creationId xmlns:p14="http://schemas.microsoft.com/office/powerpoint/2010/main" val="2535482467"/>
+      </p:ext>
+    </p:extLst>
+  </p:cSld>
+  <p:clrMapOvr>
+    <a:masterClrMapping/>
+  </p:clrMapOvr>
+</p:sld>
+</file>
+
 <file path=ppt/slides/slide2.xml><?xml version="1.0" encoding="utf-8"?>
 <p:sld xmlns:a="http://schemas.openxmlformats.org/drawingml/2006/main" xmlns:r="http://schemas.openxmlformats.org/officeDocument/2006/relationships" xmlns:p="http://schemas.openxmlformats.org/presentationml/2006/main">
   <p:cSld>
@@ -4612,33 +4715,30 @@
           <a:bodyPr/>
           <a:lstStyle/>
           <a:p>
+            <a:endParaRPr lang="en-US" dirty="0" smtClean="0"/>
+          </a:p>
+          <a:p>
+            <a:endParaRPr lang="en-US" dirty="0"/>
+          </a:p>
+          <a:p>
+            <a:endParaRPr lang="en-US" dirty="0" smtClean="0"/>
+          </a:p>
+          <a:p>
+            <a:endParaRPr lang="en-US" dirty="0"/>
+          </a:p>
+          <a:p>
+            <a:r>
+              <a:rPr lang="en-US" dirty="0" smtClean="0"/>
+              <a:t>Steve </a:t>
+            </a:r>
             <a:r>
               <a:rPr lang="en-US" dirty="0"/>
-              <a:t>Steve Duitsman</a:t>
-            </a:r>
-          </a:p>
-          <a:p>
-            <a:endParaRPr lang="en-US" dirty="0"/>
-          </a:p>
-          <a:p>
-            <a:r>
-              <a:rPr lang="en-US" smtClean="0"/>
-              <a:t>Consultant </a:t>
-            </a:r>
-            <a:r>
-              <a:rPr lang="en-US" dirty="0"/>
-              <a:t>since 2003</a:t>
-            </a:r>
-          </a:p>
-          <a:p>
-            <a:endParaRPr lang="en-US" dirty="0" smtClean="0"/>
-          </a:p>
-          <a:p>
-            <a:endParaRPr lang="en-US" dirty="0"/>
-          </a:p>
-          <a:p>
-            <a:r>
-              <a:rPr lang="en-US" sz="2400" dirty="0"/>
+              <a:t>Duitsman</a:t>
+            </a:r>
+          </a:p>
+          <a:p>
+            <a:r>
+              <a:rPr lang="en-US" sz="2400" dirty="0" smtClean="0"/>
               <a:t>@</a:t>
             </a:r>
             <a:r>
@@ -4762,8 +4862,17 @@
             </a:pPr>
             <a:r>
               <a:rPr lang="en-US" dirty="0"/>
-              <a:t>Client-Side MVVM Library in JavaScript</a:t>
-            </a:r>
+              <a:t>Client-Side MVVM </a:t>
+            </a:r>
+            <a:r>
+              <a:rPr lang="en-US" dirty="0" smtClean="0"/>
+              <a:t>JavaScript </a:t>
+            </a:r>
+            <a:r>
+              <a:rPr lang="en-US" dirty="0"/>
+              <a:t>Library </a:t>
+            </a:r>
+            <a:endParaRPr lang="en-US" dirty="0"/>
           </a:p>
           <a:p>
             <a:pPr marL="342900" indent="-342900">
@@ -4786,7 +4895,11 @@
             </a:r>
             <a:r>
               <a:rPr lang="en-US" dirty="0" smtClean="0"/>
-              <a:t>Dependencies, works with any framework</a:t>
+              <a:t>d</a:t>
+            </a:r>
+            <a:r>
+              <a:rPr lang="en-US" dirty="0" smtClean="0"/>
+              <a:t>ependencies</a:t>
             </a:r>
             <a:endParaRPr lang="en-US" dirty="0"/>
           </a:p>
@@ -4826,9 +4939,39 @@
               <a:buChar char="•"/>
             </a:pPr>
             <a:r>
-              <a:rPr lang="en-US" dirty="0"/>
-              <a:t>Developed with BDD (link to tests)</a:t>
-            </a:r>
+              <a:rPr lang="en-US" dirty="0">
+                <a:hlinkClick r:id="rId2"/>
+              </a:rPr>
+              <a:t>Developed with </a:t>
+            </a:r>
+            <a:r>
+              <a:rPr lang="en-US" dirty="0" smtClean="0">
+                <a:hlinkClick r:id="rId2"/>
+              </a:rPr>
+              <a:t>BDD</a:t>
+            </a:r>
+            <a:endParaRPr lang="en-US" dirty="0" smtClean="0"/>
+          </a:p>
+          <a:p>
+            <a:pPr marL="342900" indent="-342900">
+              <a:buFont typeface="Arial" pitchFamily="34" charset="0"/>
+              <a:buChar char="•"/>
+            </a:pPr>
+            <a:r>
+              <a:rPr lang="en-US" dirty="0" err="1" smtClean="0"/>
+              <a:t>NuGet</a:t>
+            </a:r>
+            <a:r>
+              <a:rPr lang="en-US" dirty="0" smtClean="0"/>
+              <a:t> or </a:t>
+            </a:r>
+            <a:r>
+              <a:rPr lang="en-US" dirty="0" smtClean="0">
+                <a:hlinkClick r:id="rId3"/>
+              </a:rPr>
+              <a:t>knockoutjs.com</a:t>
+            </a:r>
+            <a:endParaRPr lang="en-US" dirty="0"/>
           </a:p>
           <a:p>
             <a:endParaRPr lang="en-US" dirty="0"/>
@@ -5771,6 +5914,21 @@
 <file path=ppt/slides/slide6.xml><?xml version="1.0" encoding="utf-8"?>
 <p:sld xmlns:a="http://schemas.openxmlformats.org/drawingml/2006/main" xmlns:r="http://schemas.openxmlformats.org/officeDocument/2006/relationships" xmlns:p="http://schemas.openxmlformats.org/presentationml/2006/main">
   <p:cSld>
+    <p:bg>
+      <p:bgPr>
+        <a:blipFill dpi="0" rotWithShape="1">
+          <a:blip r:embed="rId2">
+            <a:alphaModFix amt="50000"/>
+            <a:lum/>
+          </a:blip>
+          <a:srcRect/>
+          <a:stretch>
+            <a:fillRect t="-22000" b="-22000"/>
+          </a:stretch>
+        </a:blipFill>
+        <a:effectLst/>
+      </p:bgPr>
+    </p:bg>
     <p:spTree>
       <p:nvGrpSpPr>
         <p:cNvPr id="1" name=""/>
@@ -5801,8 +5959,8 @@
           <a:lstStyle/>
           <a:p>
             <a:r>
-              <a:rPr lang="en-US" dirty="0" err="1" smtClean="0"/>
-              <a:t>Dermos</a:t>
+              <a:rPr lang="en-US" dirty="0" smtClean="0"/>
+              <a:t>Demo</a:t>
             </a:r>
             <a:endParaRPr lang="en-US" dirty="0"/>
           </a:p>
@@ -5823,10 +5981,6 @@
           <a:bodyPr/>
           <a:lstStyle/>
           <a:p>
-            <a:r>
-              <a:rPr lang="en-US" dirty="0" smtClean="0"/>
-              <a:t>ERMAHGERD!</a:t>
-            </a:r>
             <a:endParaRPr lang="en-US" dirty="0"/>
           </a:p>
         </p:txBody>
@@ -5901,12 +6055,12 @@
       </p:grpSpPr>
       <p:sp>
         <p:nvSpPr>
-          <p:cNvPr id="2" name="Title 1"/>
-          <p:cNvSpPr>
-            <a:spLocks noGrp="1"/>
-          </p:cNvSpPr>
-          <p:nvPr>
-            <p:ph type="title"/>
+          <p:cNvPr id="3" name="Text Placeholder 2"/>
+          <p:cNvSpPr>
+            <a:spLocks noGrp="1"/>
+          </p:cNvSpPr>
+          <p:nvPr>
+            <p:ph type="body" idx="1"/>
           </p:nvPr>
         </p:nvSpPr>
         <p:spPr/>
@@ -5914,6 +6068,48 @@
           <a:bodyPr/>
           <a:lstStyle/>
           <a:p>
+            <a:endParaRPr lang="en-US" dirty="0"/>
+          </a:p>
+        </p:txBody>
+      </p:sp>
+      <p:sp>
+        <p:nvSpPr>
+          <p:cNvPr id="4" name="Footer Placeholder 3"/>
+          <p:cNvSpPr>
+            <a:spLocks noGrp="1"/>
+          </p:cNvSpPr>
+          <p:nvPr>
+            <p:ph type="ftr" sz="quarter" idx="10"/>
+          </p:nvPr>
+        </p:nvSpPr>
+        <p:spPr/>
+        <p:txBody>
+          <a:bodyPr/>
+          <a:lstStyle/>
+          <a:p>
+            <a:r>
+              <a:rPr lang="en-US" smtClean="0"/>
+              <a:t>fast.  forward.  thinking.</a:t>
+            </a:r>
+            <a:endParaRPr lang="en-US" dirty="0"/>
+          </a:p>
+        </p:txBody>
+      </p:sp>
+      <p:sp>
+        <p:nvSpPr>
+          <p:cNvPr id="2" name="Title 1"/>
+          <p:cNvSpPr>
+            <a:spLocks noGrp="1"/>
+          </p:cNvSpPr>
+          <p:nvPr>
+            <p:ph type="title"/>
+          </p:nvPr>
+        </p:nvSpPr>
+        <p:spPr/>
+        <p:txBody>
+          <a:bodyPr/>
+          <a:lstStyle/>
+          <a:p>
             <a:r>
               <a:rPr lang="en-US" dirty="0" smtClean="0"/>
               <a:t>Why Knockout?</a:t>
@@ -5922,48 +6118,36 @@
           </a:p>
         </p:txBody>
       </p:sp>
-      <p:sp>
-        <p:nvSpPr>
-          <p:cNvPr id="3" name="Text Placeholder 2"/>
-          <p:cNvSpPr>
-            <a:spLocks noGrp="1"/>
-          </p:cNvSpPr>
-          <p:nvPr>
-            <p:ph type="body" idx="1"/>
-          </p:nvPr>
-        </p:nvSpPr>
-        <p:spPr/>
-        <p:txBody>
-          <a:bodyPr/>
-          <a:lstStyle/>
-          <a:p>
-            <a:endParaRPr lang="en-US"/>
-          </a:p>
-        </p:txBody>
-      </p:sp>
-      <p:sp>
-        <p:nvSpPr>
-          <p:cNvPr id="4" name="Footer Placeholder 3"/>
-          <p:cNvSpPr>
-            <a:spLocks noGrp="1"/>
-          </p:cNvSpPr>
-          <p:nvPr>
-            <p:ph type="ftr" sz="quarter" idx="10"/>
-          </p:nvPr>
-        </p:nvSpPr>
-        <p:spPr/>
-        <p:txBody>
-          <a:bodyPr/>
-          <a:lstStyle/>
-          <a:p>
-            <a:r>
-              <a:rPr lang="en-US" smtClean="0"/>
-              <a:t>fast.  forward.  thinking.</a:t>
-            </a:r>
-            <a:endParaRPr lang="en-US" dirty="0"/>
-          </a:p>
-        </p:txBody>
-      </p:sp>
+      <p:pic>
+        <p:nvPicPr>
+          <p:cNvPr id="8" name="Picture 7"/>
+          <p:cNvPicPr>
+            <a:picLocks noChangeAspect="1"/>
+          </p:cNvPicPr>
+          <p:nvPr/>
+        </p:nvPicPr>
+        <p:blipFill>
+          <a:blip r:embed="rId2">
+            <a:extLst>
+              <a:ext uri="{28A0092B-C50C-407E-A947-70E740481C1C}">
+                <a14:useLocalDpi xmlns:a14="http://schemas.microsoft.com/office/drawing/2010/main" val="0"/>
+              </a:ext>
+            </a:extLst>
+          </a:blip>
+          <a:stretch>
+            <a:fillRect/>
+          </a:stretch>
+        </p:blipFill>
+        <p:spPr>
+          <a:xfrm>
+            <a:off x="4495854" y="-57626"/>
+            <a:ext cx="4558589" cy="3637174"/>
+          </a:xfrm>
+          <a:prstGeom prst="rect">
+            <a:avLst/>
+          </a:prstGeom>
+        </p:spPr>
+      </p:pic>
     </p:spTree>
     <p:extLst>
       <p:ext uri="{BB962C8B-B14F-4D97-AF65-F5344CB8AC3E}">
@@ -6018,7 +6202,7 @@
           <a:p>
             <a:r>
               <a:rPr lang="en-US" dirty="0" smtClean="0"/>
-              <a:t>Resources</a:t>
+              <a:t>Why Knockout</a:t>
             </a:r>
             <a:endParaRPr lang="en-US" dirty="0"/>
           </a:p>
@@ -6044,31 +6228,8 @@
               <a:buChar char="•"/>
             </a:pPr>
             <a:r>
-              <a:rPr lang="en-US" dirty="0" smtClean="0">
-                <a:hlinkClick r:id="rId2"/>
-              </a:rPr>
-              <a:t>knockoutjs.com</a:t>
-            </a:r>
-            <a:endParaRPr lang="en-US" dirty="0" smtClean="0"/>
-          </a:p>
-          <a:p>
-            <a:pPr marL="1200150" lvl="1" indent="-457200">
-              <a:buFont typeface="Arial" pitchFamily="34" charset="0"/>
-              <a:buChar char="•"/>
-            </a:pPr>
-            <a:r>
               <a:rPr lang="en-US" dirty="0" smtClean="0"/>
-              <a:t>Live Examples/Tutorials</a:t>
-            </a:r>
-          </a:p>
-          <a:p>
-            <a:pPr marL="1200150" lvl="1" indent="-457200">
-              <a:buFont typeface="Arial" pitchFamily="34" charset="0"/>
-              <a:buChar char="•"/>
-            </a:pPr>
-            <a:r>
-              <a:rPr lang="en-US" dirty="0" smtClean="0"/>
-              <a:t>Documentation</a:t>
+              <a:t>High level link between UI &amp; data model</a:t>
             </a:r>
           </a:p>
           <a:p>
@@ -6077,22 +6238,9 @@
               <a:buChar char="•"/>
             </a:pPr>
             <a:r>
-              <a:rPr lang="en-US" dirty="0"/>
-              <a:t>Knock Me Out - Ryan </a:t>
-            </a:r>
-            <a:r>
-              <a:rPr lang="en-US" dirty="0" err="1"/>
-              <a:t>Neimeier’s</a:t>
-            </a:r>
-            <a:r>
-              <a:rPr lang="en-US"/>
-              <a:t> </a:t>
-            </a:r>
-            <a:r>
-              <a:rPr lang="en-US" smtClean="0"/>
-              <a:t>blog</a:t>
-            </a:r>
-            <a:endParaRPr lang="en-US" smtClean="0"/>
+              <a:rPr lang="en-US" dirty="0" smtClean="0"/>
+              <a:t>Extensible</a:t>
+            </a:r>
           </a:p>
           <a:p>
             <a:pPr marL="457200" indent="-457200">
@@ -6100,69 +6248,42 @@
               <a:buChar char="•"/>
             </a:pPr>
             <a:r>
-              <a:rPr lang="en-US" dirty="0" err="1" smtClean="0"/>
-              <a:t>Pluralsight</a:t>
-            </a:r>
-            <a:r>
               <a:rPr lang="en-US" dirty="0" smtClean="0"/>
-              <a:t> courses</a:t>
-            </a:r>
-            <a:endParaRPr lang="en-US" dirty="0" smtClean="0"/>
-          </a:p>
-          <a:p>
-            <a:pPr marL="1200150" lvl="1" indent="-457200">
+              <a:t>Usable in existing apps/architecture</a:t>
+            </a:r>
+          </a:p>
+          <a:p>
+            <a:pPr marL="457200" indent="-457200">
               <a:buFont typeface="Arial" pitchFamily="34" charset="0"/>
               <a:buChar char="•"/>
             </a:pPr>
             <a:r>
-              <a:rPr lang="en-US" dirty="0" smtClean="0">
-                <a:hlinkClick r:id="rId3"/>
-              </a:rPr>
-              <a:t>Knockout Fundamentals</a:t>
-            </a:r>
-            <a:endParaRPr lang="en-US" dirty="0" smtClean="0"/>
-          </a:p>
-          <a:p>
-            <a:pPr marL="1200150" lvl="1" indent="-457200">
+              <a:rPr lang="en-US" dirty="0" smtClean="0"/>
+              <a:t>Learning Resources</a:t>
+            </a:r>
+          </a:p>
+          <a:p>
+            <a:pPr marL="457200" indent="-457200">
               <a:buFont typeface="Arial" pitchFamily="34" charset="0"/>
               <a:buChar char="•"/>
             </a:pPr>
             <a:r>
-              <a:rPr lang="en-US" dirty="0" smtClean="0">
-                <a:hlinkClick r:id="rId4"/>
-              </a:rPr>
-              <a:t>HTML5 and JS Apps With MVVM and Knockout</a:t>
-            </a:r>
-            <a:endParaRPr lang="en-US" dirty="0" smtClean="0"/>
-          </a:p>
-          <a:p>
-            <a:pPr marL="1200150" lvl="1" indent="-457200">
-              <a:buFont typeface="Arial" pitchFamily="34" charset="0"/>
-              <a:buChar char="•"/>
-            </a:pPr>
-            <a:r>
-              <a:rPr lang="en-US" dirty="0" smtClean="0">
-                <a:hlinkClick r:id="rId5"/>
-              </a:rPr>
-              <a:t>SPAs with HTML5, </a:t>
-            </a:r>
-            <a:r>
-              <a:rPr lang="en-US" dirty="0" err="1" smtClean="0">
-                <a:hlinkClick r:id="rId5"/>
-              </a:rPr>
-              <a:t>WebAPI</a:t>
-            </a:r>
-            <a:r>
-              <a:rPr lang="en-US" dirty="0" smtClean="0">
-                <a:hlinkClick r:id="rId5"/>
-              </a:rPr>
-              <a:t>, Knockout and </a:t>
-            </a:r>
-            <a:r>
-              <a:rPr lang="en-US" dirty="0" err="1" smtClean="0">
-                <a:hlinkClick r:id="rId5"/>
-              </a:rPr>
-              <a:t>jQuery</a:t>
+              <a:rPr lang="en-US" dirty="0" smtClean="0"/>
+              <a:t>Same MV* pattern &amp; benefits as other solutions</a:t>
+            </a:r>
+          </a:p>
+          <a:p>
+            <a:pPr algn="ctr"/>
+            <a:r>
+              <a:rPr lang="en-US" i="1" dirty="0" smtClean="0"/>
+              <a:t>It boils down to:</a:t>
+            </a:r>
+          </a:p>
+          <a:p>
+            <a:pPr algn="ctr"/>
+            <a:r>
+              <a:rPr lang="en-US" dirty="0" smtClean="0"/>
+              <a:t>	Scope &amp; Feel</a:t>
             </a:r>
             <a:endParaRPr lang="en-US" dirty="0" smtClean="0"/>
           </a:p>
@@ -6245,20 +6366,20 @@
           <a:p>
             <a:r>
               <a:rPr lang="en-US" dirty="0" smtClean="0"/>
-              <a:t>Questions</a:t>
-            </a:r>
-            <a:endParaRPr lang="en-US" dirty="0"/>
-          </a:p>
-        </p:txBody>
-      </p:sp>
-      <p:sp>
-        <p:nvSpPr>
-          <p:cNvPr id="3" name="Text Placeholder 2"/>
-          <p:cNvSpPr>
-            <a:spLocks noGrp="1"/>
-          </p:cNvSpPr>
-          <p:nvPr>
-            <p:ph type="body" idx="1"/>
+              <a:t>Resources</a:t>
+            </a:r>
+            <a:endParaRPr lang="en-US" dirty="0"/>
+          </a:p>
+        </p:txBody>
+      </p:sp>
+      <p:sp>
+        <p:nvSpPr>
+          <p:cNvPr id="3" name="Content Placeholder 2"/>
+          <p:cNvSpPr>
+            <a:spLocks noGrp="1"/>
+          </p:cNvSpPr>
+          <p:nvPr>
+            <p:ph idx="1"/>
           </p:nvPr>
         </p:nvSpPr>
         <p:spPr/>
@@ -6266,7 +6387,130 @@
           <a:bodyPr/>
           <a:lstStyle/>
           <a:p>
-            <a:endParaRPr lang="en-US"/>
+            <a:pPr marL="457200" indent="-457200">
+              <a:buFont typeface="Arial" pitchFamily="34" charset="0"/>
+              <a:buChar char="•"/>
+            </a:pPr>
+            <a:r>
+              <a:rPr lang="en-US" dirty="0" smtClean="0">
+                <a:hlinkClick r:id="rId2"/>
+              </a:rPr>
+              <a:t>knockoutjs.com</a:t>
+            </a:r>
+            <a:endParaRPr lang="en-US" dirty="0" smtClean="0"/>
+          </a:p>
+          <a:p>
+            <a:pPr marL="1200150" lvl="1" indent="-457200">
+              <a:buFont typeface="Arial" pitchFamily="34" charset="0"/>
+              <a:buChar char="•"/>
+            </a:pPr>
+            <a:r>
+              <a:rPr lang="en-US" dirty="0" smtClean="0"/>
+              <a:t>Live Examples/Tutorials</a:t>
+            </a:r>
+          </a:p>
+          <a:p>
+            <a:pPr marL="1200150" lvl="1" indent="-457200">
+              <a:buFont typeface="Arial" pitchFamily="34" charset="0"/>
+              <a:buChar char="•"/>
+            </a:pPr>
+            <a:r>
+              <a:rPr lang="en-US" dirty="0" smtClean="0"/>
+              <a:t>Documentation</a:t>
+            </a:r>
+          </a:p>
+          <a:p>
+            <a:pPr marL="457200" indent="-457200">
+              <a:buFont typeface="Arial" pitchFamily="34" charset="0"/>
+              <a:buChar char="•"/>
+            </a:pPr>
+            <a:r>
+              <a:rPr lang="en-US" dirty="0">
+                <a:hlinkClick r:id="rId3"/>
+              </a:rPr>
+              <a:t>Knock Me Out </a:t>
+            </a:r>
+            <a:r>
+              <a:rPr lang="en-US" dirty="0"/>
+              <a:t>- Ryan </a:t>
+            </a:r>
+            <a:r>
+              <a:rPr lang="en-US" dirty="0" smtClean="0"/>
+              <a:t>Niemeyer’s blog</a:t>
+            </a:r>
+            <a:endParaRPr lang="en-US" dirty="0" smtClean="0"/>
+          </a:p>
+          <a:p>
+            <a:pPr marL="457200" indent="-457200">
+              <a:buFont typeface="Arial" pitchFamily="34" charset="0"/>
+              <a:buChar char="•"/>
+            </a:pPr>
+            <a:r>
+              <a:rPr lang="en-US" dirty="0" err="1" smtClean="0"/>
+              <a:t>PluralSight</a:t>
+            </a:r>
+            <a:r>
+              <a:rPr lang="en-US" dirty="0" smtClean="0"/>
+              <a:t> Courses</a:t>
+            </a:r>
+            <a:endParaRPr lang="en-US" dirty="0" smtClean="0"/>
+          </a:p>
+          <a:p>
+            <a:pPr marL="1200150" lvl="1" indent="-457200">
+              <a:buFont typeface="Arial" pitchFamily="34" charset="0"/>
+              <a:buChar char="•"/>
+            </a:pPr>
+            <a:r>
+              <a:rPr lang="en-US" dirty="0" smtClean="0">
+                <a:hlinkClick r:id="rId4"/>
+              </a:rPr>
+              <a:t>Knockout Fundamentals</a:t>
+            </a:r>
+            <a:endParaRPr lang="en-US" dirty="0" smtClean="0"/>
+          </a:p>
+          <a:p>
+            <a:pPr marL="1200150" lvl="1" indent="-457200">
+              <a:buFont typeface="Arial" pitchFamily="34" charset="0"/>
+              <a:buChar char="•"/>
+            </a:pPr>
+            <a:r>
+              <a:rPr lang="en-US" dirty="0" smtClean="0">
+                <a:hlinkClick r:id="rId5"/>
+              </a:rPr>
+              <a:t>HTML5 and JS Apps With MVVM and Knockout</a:t>
+            </a:r>
+            <a:endParaRPr lang="en-US" dirty="0" smtClean="0"/>
+          </a:p>
+          <a:p>
+            <a:pPr marL="1200150" lvl="1" indent="-457200">
+              <a:buFont typeface="Arial" pitchFamily="34" charset="0"/>
+              <a:buChar char="•"/>
+            </a:pPr>
+            <a:r>
+              <a:rPr lang="en-US" dirty="0" smtClean="0">
+                <a:hlinkClick r:id="rId6"/>
+              </a:rPr>
+              <a:t>SPAs with HTML5, </a:t>
+            </a:r>
+            <a:r>
+              <a:rPr lang="en-US" dirty="0" err="1" smtClean="0">
+                <a:hlinkClick r:id="rId6"/>
+              </a:rPr>
+              <a:t>WebAPI</a:t>
+            </a:r>
+            <a:r>
+              <a:rPr lang="en-US" dirty="0" smtClean="0">
+                <a:hlinkClick r:id="rId6"/>
+              </a:rPr>
+              <a:t>, Knockout and </a:t>
+            </a:r>
+            <a:r>
+              <a:rPr lang="en-US" dirty="0" err="1" smtClean="0">
+                <a:hlinkClick r:id="rId6"/>
+              </a:rPr>
+              <a:t>jQuery</a:t>
+            </a:r>
+            <a:endParaRPr lang="en-US" dirty="0" smtClean="0"/>
           </a:p>
         </p:txBody>
       </p:sp>
@@ -6277,7 +6521,7 @@
             <a:spLocks noGrp="1"/>
           </p:cNvSpPr>
           <p:nvPr>
-            <p:ph type="ftr" sz="quarter" idx="10"/>
+            <p:ph type="ftr" sz="quarter" idx="13"/>
           </p:nvPr>
         </p:nvSpPr>
         <p:spPr/>
@@ -6296,13 +6540,20 @@
     </p:spTree>
     <p:extLst>
       <p:ext uri="{BB962C8B-B14F-4D97-AF65-F5344CB8AC3E}">
-        <p14:creationId xmlns:p14="http://schemas.microsoft.com/office/powerpoint/2010/main" val="2535482467"/>
+        <p14:creationId xmlns:p14="http://schemas.microsoft.com/office/powerpoint/2010/main" val="3856957452"/>
       </p:ext>
     </p:extLst>
   </p:cSld>
   <p:clrMapOvr>
     <a:masterClrMapping/>
   </p:clrMapOvr>
+  <p:timing>
+    <p:tnLst>
+      <p:par>
+        <p:cTn id="1" dur="indefinite" restart="never" nodeType="tmRoot"/>
+      </p:par>
+    </p:tnLst>
+  </p:timing>
 </p:sld>
 </file>
 

</xml_diff>

<commit_message>
Use new debug text output, updated ppt
</commit_message>
<xml_diff>
--- a/Forward Thinking KnockoutJS.pptx
+++ b/Forward Thinking KnockoutJS.pptx
@@ -5,10 +5,10 @@
     <p:sldMasterId id="2147483902" r:id="rId4"/>
   </p:sldMasterIdLst>
   <p:notesMasterIdLst>
-    <p:notesMasterId r:id="rId15"/>
+    <p:notesMasterId r:id="rId18"/>
   </p:notesMasterIdLst>
   <p:handoutMasterIdLst>
-    <p:handoutMasterId r:id="rId16"/>
+    <p:handoutMasterId r:id="rId19"/>
   </p:handoutMasterIdLst>
   <p:sldIdLst>
     <p:sldId id="275" r:id="rId5"/>
@@ -17,10 +17,13 @@
     <p:sldId id="281" r:id="rId8"/>
     <p:sldId id="261" r:id="rId9"/>
     <p:sldId id="282" r:id="rId10"/>
-    <p:sldId id="267" r:id="rId11"/>
-    <p:sldId id="283" r:id="rId12"/>
-    <p:sldId id="285" r:id="rId13"/>
-    <p:sldId id="284" r:id="rId14"/>
+    <p:sldId id="286" r:id="rId11"/>
+    <p:sldId id="287" r:id="rId12"/>
+    <p:sldId id="288" r:id="rId13"/>
+    <p:sldId id="267" r:id="rId14"/>
+    <p:sldId id="283" r:id="rId15"/>
+    <p:sldId id="285" r:id="rId16"/>
+    <p:sldId id="284" r:id="rId17"/>
   </p:sldIdLst>
   <p:sldSz cx="9144000" cy="5715000" type="screen16x10"/>
   <p:notesSz cx="6858000" cy="9144000"/>
@@ -204,7 +207,7 @@
           <a:p>
             <a:fld id="{623B0249-1A93-E14F-BDFD-FA6558358E08}" type="datetime1">
               <a:rPr lang="en-US" smtClean="0"/>
-              <a:t>10/11/2012</a:t>
+              <a:t>10/14/2012</a:t>
             </a:fld>
             <a:endParaRPr lang="en-US"/>
           </a:p>
@@ -370,7 +373,7 @@
           <a:p>
             <a:fld id="{F8262410-3AAF-F14C-8529-8C8CC31E8003}" type="datetime1">
               <a:rPr lang="en-US" smtClean="0"/>
-              <a:t>10/11/2012</a:t>
+              <a:t>10/14/2012</a:t>
             </a:fld>
             <a:endParaRPr lang="en-US"/>
           </a:p>
@@ -4584,6 +4587,524 @@
       </p:grpSpPr>
       <p:sp>
         <p:nvSpPr>
+          <p:cNvPr id="3" name="Text Placeholder 2"/>
+          <p:cNvSpPr>
+            <a:spLocks noGrp="1"/>
+          </p:cNvSpPr>
+          <p:nvPr>
+            <p:ph type="body" idx="1"/>
+          </p:nvPr>
+        </p:nvSpPr>
+        <p:spPr/>
+        <p:txBody>
+          <a:bodyPr/>
+          <a:lstStyle/>
+          <a:p>
+            <a:endParaRPr lang="en-US" dirty="0"/>
+          </a:p>
+        </p:txBody>
+      </p:sp>
+      <p:sp>
+        <p:nvSpPr>
+          <p:cNvPr id="4" name="Footer Placeholder 3"/>
+          <p:cNvSpPr>
+            <a:spLocks noGrp="1"/>
+          </p:cNvSpPr>
+          <p:nvPr>
+            <p:ph type="ftr" sz="quarter" idx="10"/>
+          </p:nvPr>
+        </p:nvSpPr>
+        <p:spPr/>
+        <p:txBody>
+          <a:bodyPr/>
+          <a:lstStyle/>
+          <a:p>
+            <a:r>
+              <a:rPr lang="en-US" smtClean="0"/>
+              <a:t>fast.  forward.  thinking.</a:t>
+            </a:r>
+            <a:endParaRPr lang="en-US" dirty="0"/>
+          </a:p>
+        </p:txBody>
+      </p:sp>
+      <p:sp>
+        <p:nvSpPr>
+          <p:cNvPr id="2" name="Title 1"/>
+          <p:cNvSpPr>
+            <a:spLocks noGrp="1"/>
+          </p:cNvSpPr>
+          <p:nvPr>
+            <p:ph type="title"/>
+          </p:nvPr>
+        </p:nvSpPr>
+        <p:spPr/>
+        <p:txBody>
+          <a:bodyPr/>
+          <a:lstStyle/>
+          <a:p>
+            <a:r>
+              <a:rPr lang="en-US" dirty="0" smtClean="0"/>
+              <a:t>Why Knockout?</a:t>
+            </a:r>
+            <a:endParaRPr lang="en-US" dirty="0"/>
+          </a:p>
+        </p:txBody>
+      </p:sp>
+      <p:pic>
+        <p:nvPicPr>
+          <p:cNvPr id="8" name="Picture 7"/>
+          <p:cNvPicPr>
+            <a:picLocks noChangeAspect="1"/>
+          </p:cNvPicPr>
+          <p:nvPr/>
+        </p:nvPicPr>
+        <p:blipFill>
+          <a:blip r:embed="rId2">
+            <a:extLst>
+              <a:ext uri="{28A0092B-C50C-407E-A947-70E740481C1C}">
+                <a14:useLocalDpi xmlns:a14="http://schemas.microsoft.com/office/drawing/2010/main" val="0"/>
+              </a:ext>
+            </a:extLst>
+          </a:blip>
+          <a:stretch>
+            <a:fillRect/>
+          </a:stretch>
+        </p:blipFill>
+        <p:spPr>
+          <a:xfrm>
+            <a:off x="4495854" y="-57626"/>
+            <a:ext cx="4558589" cy="3637174"/>
+          </a:xfrm>
+          <a:prstGeom prst="rect">
+            <a:avLst/>
+          </a:prstGeom>
+        </p:spPr>
+      </p:pic>
+    </p:spTree>
+    <p:extLst>
+      <p:ext uri="{BB962C8B-B14F-4D97-AF65-F5344CB8AC3E}">
+        <p14:creationId xmlns:p14="http://schemas.microsoft.com/office/powerpoint/2010/main" val="3326783656"/>
+      </p:ext>
+    </p:extLst>
+  </p:cSld>
+  <p:clrMapOvr>
+    <a:masterClrMapping/>
+  </p:clrMapOvr>
+  <p:timing>
+    <p:tnLst>
+      <p:par>
+        <p:cTn id="1" dur="indefinite" restart="never" nodeType="tmRoot"/>
+      </p:par>
+    </p:tnLst>
+  </p:timing>
+</p:sld>
+</file>
+
+<file path=ppt/slides/slide11.xml><?xml version="1.0" encoding="utf-8"?>
+<p:sld xmlns:a="http://schemas.openxmlformats.org/drawingml/2006/main" xmlns:r="http://schemas.openxmlformats.org/officeDocument/2006/relationships" xmlns:p="http://schemas.openxmlformats.org/presentationml/2006/main">
+  <p:cSld>
+    <p:spTree>
+      <p:nvGrpSpPr>
+        <p:cNvPr id="1" name=""/>
+        <p:cNvGrpSpPr/>
+        <p:nvPr/>
+      </p:nvGrpSpPr>
+      <p:grpSpPr>
+        <a:xfrm>
+          <a:off x="0" y="0"/>
+          <a:ext cx="0" cy="0"/>
+          <a:chOff x="0" y="0"/>
+          <a:chExt cx="0" cy="0"/>
+        </a:xfrm>
+      </p:grpSpPr>
+      <p:sp>
+        <p:nvSpPr>
+          <p:cNvPr id="2" name="Title 1"/>
+          <p:cNvSpPr>
+            <a:spLocks noGrp="1"/>
+          </p:cNvSpPr>
+          <p:nvPr>
+            <p:ph type="title"/>
+          </p:nvPr>
+        </p:nvSpPr>
+        <p:spPr/>
+        <p:txBody>
+          <a:bodyPr/>
+          <a:lstStyle/>
+          <a:p>
+            <a:r>
+              <a:rPr lang="en-US" dirty="0" smtClean="0"/>
+              <a:t>Why Knockout</a:t>
+            </a:r>
+            <a:endParaRPr lang="en-US" dirty="0"/>
+          </a:p>
+        </p:txBody>
+      </p:sp>
+      <p:sp>
+        <p:nvSpPr>
+          <p:cNvPr id="3" name="Content Placeholder 2"/>
+          <p:cNvSpPr>
+            <a:spLocks noGrp="1"/>
+          </p:cNvSpPr>
+          <p:nvPr>
+            <p:ph idx="1"/>
+          </p:nvPr>
+        </p:nvSpPr>
+        <p:spPr/>
+        <p:txBody>
+          <a:bodyPr/>
+          <a:lstStyle/>
+          <a:p>
+            <a:pPr marL="457200" indent="-457200">
+              <a:buFont typeface="Arial" pitchFamily="34" charset="0"/>
+              <a:buChar char="•"/>
+            </a:pPr>
+            <a:r>
+              <a:rPr lang="en-US" dirty="0" smtClean="0"/>
+              <a:t>High level link between UI &amp; data model</a:t>
+            </a:r>
+          </a:p>
+          <a:p>
+            <a:pPr marL="457200" indent="-457200">
+              <a:buFont typeface="Arial" pitchFamily="34" charset="0"/>
+              <a:buChar char="•"/>
+            </a:pPr>
+            <a:r>
+              <a:rPr lang="en-US" dirty="0" smtClean="0"/>
+              <a:t>Extensible</a:t>
+            </a:r>
+          </a:p>
+          <a:p>
+            <a:pPr marL="457200" indent="-457200">
+              <a:buFont typeface="Arial" pitchFamily="34" charset="0"/>
+              <a:buChar char="•"/>
+            </a:pPr>
+            <a:r>
+              <a:rPr lang="en-US" dirty="0" smtClean="0"/>
+              <a:t>Usable in existing apps/architecture</a:t>
+            </a:r>
+          </a:p>
+          <a:p>
+            <a:pPr marL="457200" indent="-457200">
+              <a:buFont typeface="Arial" pitchFamily="34" charset="0"/>
+              <a:buChar char="•"/>
+            </a:pPr>
+            <a:r>
+              <a:rPr lang="en-US" dirty="0" smtClean="0"/>
+              <a:t>Learning Resources</a:t>
+            </a:r>
+          </a:p>
+          <a:p>
+            <a:pPr marL="457200" indent="-457200">
+              <a:buFont typeface="Arial" pitchFamily="34" charset="0"/>
+              <a:buChar char="•"/>
+            </a:pPr>
+            <a:r>
+              <a:rPr lang="en-US" dirty="0" smtClean="0"/>
+              <a:t>Same MV* pattern &amp; benefits as other solutions</a:t>
+            </a:r>
+          </a:p>
+          <a:p>
+            <a:pPr algn="ctr"/>
+            <a:r>
+              <a:rPr lang="en-US" i="1" dirty="0" smtClean="0"/>
+              <a:t>It boils down to:</a:t>
+            </a:r>
+          </a:p>
+          <a:p>
+            <a:pPr algn="ctr"/>
+            <a:r>
+              <a:rPr lang="en-US" dirty="0" smtClean="0"/>
+              <a:t>	Scope &amp; Feel</a:t>
+            </a:r>
+          </a:p>
+        </p:txBody>
+      </p:sp>
+      <p:sp>
+        <p:nvSpPr>
+          <p:cNvPr id="4" name="Footer Placeholder 3"/>
+          <p:cNvSpPr>
+            <a:spLocks noGrp="1"/>
+          </p:cNvSpPr>
+          <p:nvPr>
+            <p:ph type="ftr" sz="quarter" idx="13"/>
+          </p:nvPr>
+        </p:nvSpPr>
+        <p:spPr/>
+        <p:txBody>
+          <a:bodyPr/>
+          <a:lstStyle/>
+          <a:p>
+            <a:r>
+              <a:rPr lang="en-US" smtClean="0"/>
+              <a:t>fast.  forward.  thinking.</a:t>
+            </a:r>
+            <a:endParaRPr lang="en-US" dirty="0"/>
+          </a:p>
+        </p:txBody>
+      </p:sp>
+    </p:spTree>
+    <p:extLst>
+      <p:ext uri="{BB962C8B-B14F-4D97-AF65-F5344CB8AC3E}">
+        <p14:creationId xmlns:p14="http://schemas.microsoft.com/office/powerpoint/2010/main" val="2407669448"/>
+      </p:ext>
+    </p:extLst>
+  </p:cSld>
+  <p:clrMapOvr>
+    <a:masterClrMapping/>
+  </p:clrMapOvr>
+  <p:timing>
+    <p:tnLst>
+      <p:par>
+        <p:cTn id="1" dur="indefinite" restart="never" nodeType="tmRoot"/>
+      </p:par>
+    </p:tnLst>
+  </p:timing>
+</p:sld>
+</file>
+
+<file path=ppt/slides/slide12.xml><?xml version="1.0" encoding="utf-8"?>
+<p:sld xmlns:a="http://schemas.openxmlformats.org/drawingml/2006/main" xmlns:r="http://schemas.openxmlformats.org/officeDocument/2006/relationships" xmlns:p="http://schemas.openxmlformats.org/presentationml/2006/main">
+  <p:cSld>
+    <p:spTree>
+      <p:nvGrpSpPr>
+        <p:cNvPr id="1" name=""/>
+        <p:cNvGrpSpPr/>
+        <p:nvPr/>
+      </p:nvGrpSpPr>
+      <p:grpSpPr>
+        <a:xfrm>
+          <a:off x="0" y="0"/>
+          <a:ext cx="0" cy="0"/>
+          <a:chOff x="0" y="0"/>
+          <a:chExt cx="0" cy="0"/>
+        </a:xfrm>
+      </p:grpSpPr>
+      <p:sp>
+        <p:nvSpPr>
+          <p:cNvPr id="2" name="Title 1"/>
+          <p:cNvSpPr>
+            <a:spLocks noGrp="1"/>
+          </p:cNvSpPr>
+          <p:nvPr>
+            <p:ph type="title"/>
+          </p:nvPr>
+        </p:nvSpPr>
+        <p:spPr/>
+        <p:txBody>
+          <a:bodyPr/>
+          <a:lstStyle/>
+          <a:p>
+            <a:r>
+              <a:rPr lang="en-US" dirty="0" smtClean="0"/>
+              <a:t>Resources</a:t>
+            </a:r>
+            <a:endParaRPr lang="en-US" dirty="0"/>
+          </a:p>
+        </p:txBody>
+      </p:sp>
+      <p:sp>
+        <p:nvSpPr>
+          <p:cNvPr id="3" name="Content Placeholder 2"/>
+          <p:cNvSpPr>
+            <a:spLocks noGrp="1"/>
+          </p:cNvSpPr>
+          <p:nvPr>
+            <p:ph idx="1"/>
+          </p:nvPr>
+        </p:nvSpPr>
+        <p:spPr/>
+        <p:txBody>
+          <a:bodyPr/>
+          <a:lstStyle/>
+          <a:p>
+            <a:pPr marL="457200" indent="-457200">
+              <a:buFont typeface="Arial" pitchFamily="34" charset="0"/>
+              <a:buChar char="•"/>
+            </a:pPr>
+            <a:r>
+              <a:rPr lang="en-US" dirty="0" smtClean="0">
+                <a:hlinkClick r:id="rId2"/>
+              </a:rPr>
+              <a:t>knockoutjs.com</a:t>
+            </a:r>
+            <a:endParaRPr lang="en-US" dirty="0" smtClean="0"/>
+          </a:p>
+          <a:p>
+            <a:pPr marL="1200150" lvl="1" indent="-457200">
+              <a:buFont typeface="Arial" pitchFamily="34" charset="0"/>
+              <a:buChar char="•"/>
+            </a:pPr>
+            <a:r>
+              <a:rPr lang="en-US" dirty="0" smtClean="0"/>
+              <a:t>Live Examples/Tutorials</a:t>
+            </a:r>
+          </a:p>
+          <a:p>
+            <a:pPr marL="1200150" lvl="1" indent="-457200">
+              <a:buFont typeface="Arial" pitchFamily="34" charset="0"/>
+              <a:buChar char="•"/>
+            </a:pPr>
+            <a:r>
+              <a:rPr lang="en-US" dirty="0" smtClean="0"/>
+              <a:t>Documentation</a:t>
+            </a:r>
+          </a:p>
+          <a:p>
+            <a:pPr marL="457200" indent="-457200">
+              <a:buFont typeface="Arial" pitchFamily="34" charset="0"/>
+              <a:buChar char="•"/>
+            </a:pPr>
+            <a:r>
+              <a:rPr lang="en-US" dirty="0">
+                <a:hlinkClick r:id="rId3"/>
+              </a:rPr>
+              <a:t>Knock Me Out </a:t>
+            </a:r>
+            <a:r>
+              <a:rPr lang="en-US" dirty="0"/>
+              <a:t>- Ryan </a:t>
+            </a:r>
+            <a:r>
+              <a:rPr lang="en-US" dirty="0" smtClean="0"/>
+              <a:t>Niemeyer’s blog</a:t>
+            </a:r>
+          </a:p>
+          <a:p>
+            <a:pPr marL="457200" indent="-457200">
+              <a:buFont typeface="Arial" pitchFamily="34" charset="0"/>
+              <a:buChar char="•"/>
+            </a:pPr>
+            <a:r>
+              <a:rPr lang="en-US" dirty="0" err="1" smtClean="0"/>
+              <a:t>PluralSight</a:t>
+            </a:r>
+            <a:r>
+              <a:rPr lang="en-US" dirty="0" smtClean="0"/>
+              <a:t> Courses</a:t>
+            </a:r>
+          </a:p>
+          <a:p>
+            <a:pPr marL="1200150" lvl="1" indent="-457200">
+              <a:buFont typeface="Arial" pitchFamily="34" charset="0"/>
+              <a:buChar char="•"/>
+            </a:pPr>
+            <a:r>
+              <a:rPr lang="en-US" dirty="0" smtClean="0">
+                <a:hlinkClick r:id="rId4"/>
+              </a:rPr>
+              <a:t>Knockout Fundamentals</a:t>
+            </a:r>
+            <a:endParaRPr lang="en-US" dirty="0" smtClean="0"/>
+          </a:p>
+          <a:p>
+            <a:pPr marL="1200150" lvl="1" indent="-457200">
+              <a:buFont typeface="Arial" pitchFamily="34" charset="0"/>
+              <a:buChar char="•"/>
+            </a:pPr>
+            <a:r>
+              <a:rPr lang="en-US" dirty="0" smtClean="0">
+                <a:hlinkClick r:id="rId5"/>
+              </a:rPr>
+              <a:t>HTML5 and JS Apps With MVVM and Knockout</a:t>
+            </a:r>
+            <a:endParaRPr lang="en-US" dirty="0" smtClean="0"/>
+          </a:p>
+          <a:p>
+            <a:pPr marL="1200150" lvl="1" indent="-457200">
+              <a:buFont typeface="Arial" pitchFamily="34" charset="0"/>
+              <a:buChar char="•"/>
+            </a:pPr>
+            <a:r>
+              <a:rPr lang="en-US" dirty="0" smtClean="0">
+                <a:hlinkClick r:id="rId6"/>
+              </a:rPr>
+              <a:t>SPAs with HTML5, </a:t>
+            </a:r>
+            <a:r>
+              <a:rPr lang="en-US" dirty="0" err="1" smtClean="0">
+                <a:hlinkClick r:id="rId6"/>
+              </a:rPr>
+              <a:t>WebAPI</a:t>
+            </a:r>
+            <a:r>
+              <a:rPr lang="en-US" dirty="0" smtClean="0">
+                <a:hlinkClick r:id="rId6"/>
+              </a:rPr>
+              <a:t>, Knockout and </a:t>
+            </a:r>
+            <a:r>
+              <a:rPr lang="en-US" dirty="0" err="1" smtClean="0">
+                <a:hlinkClick r:id="rId6"/>
+              </a:rPr>
+              <a:t>jQuery</a:t>
+            </a:r>
+            <a:endParaRPr lang="en-US" dirty="0" smtClean="0"/>
+          </a:p>
+        </p:txBody>
+      </p:sp>
+      <p:sp>
+        <p:nvSpPr>
+          <p:cNvPr id="4" name="Footer Placeholder 3"/>
+          <p:cNvSpPr>
+            <a:spLocks noGrp="1"/>
+          </p:cNvSpPr>
+          <p:nvPr>
+            <p:ph type="ftr" sz="quarter" idx="13"/>
+          </p:nvPr>
+        </p:nvSpPr>
+        <p:spPr/>
+        <p:txBody>
+          <a:bodyPr/>
+          <a:lstStyle/>
+          <a:p>
+            <a:r>
+              <a:rPr lang="en-US" smtClean="0"/>
+              <a:t>fast.  forward.  thinking.</a:t>
+            </a:r>
+            <a:endParaRPr lang="en-US" dirty="0"/>
+          </a:p>
+        </p:txBody>
+      </p:sp>
+    </p:spTree>
+    <p:extLst>
+      <p:ext uri="{BB962C8B-B14F-4D97-AF65-F5344CB8AC3E}">
+        <p14:creationId xmlns:p14="http://schemas.microsoft.com/office/powerpoint/2010/main" val="3856957452"/>
+      </p:ext>
+    </p:extLst>
+  </p:cSld>
+  <p:clrMapOvr>
+    <a:masterClrMapping/>
+  </p:clrMapOvr>
+  <p:timing>
+    <p:tnLst>
+      <p:par>
+        <p:cTn id="1" dur="indefinite" restart="never" nodeType="tmRoot"/>
+      </p:par>
+    </p:tnLst>
+  </p:timing>
+</p:sld>
+</file>
+
+<file path=ppt/slides/slide13.xml><?xml version="1.0" encoding="utf-8"?>
+<p:sld xmlns:a="http://schemas.openxmlformats.org/drawingml/2006/main" xmlns:r="http://schemas.openxmlformats.org/officeDocument/2006/relationships" xmlns:p="http://schemas.openxmlformats.org/presentationml/2006/main">
+  <p:cSld>
+    <p:spTree>
+      <p:nvGrpSpPr>
+        <p:cNvPr id="1" name=""/>
+        <p:cNvGrpSpPr/>
+        <p:nvPr/>
+      </p:nvGrpSpPr>
+      <p:grpSpPr>
+        <a:xfrm>
+          <a:off x="0" y="0"/>
+          <a:ext cx="0" cy="0"/>
+          <a:chOff x="0" y="0"/>
+          <a:chExt cx="0" cy="0"/>
+        </a:xfrm>
+      </p:grpSpPr>
+      <p:sp>
+        <p:nvSpPr>
           <p:cNvPr id="2" name="Title 1"/>
           <p:cNvSpPr>
             <a:spLocks noGrp="1"/>
@@ -6057,12 +6578,12 @@
       </p:grpSpPr>
       <p:sp>
         <p:nvSpPr>
-          <p:cNvPr id="3" name="Text Placeholder 2"/>
-          <p:cNvSpPr>
-            <a:spLocks noGrp="1"/>
-          </p:cNvSpPr>
-          <p:nvPr>
-            <p:ph type="body" idx="1"/>
+          <p:cNvPr id="2" name="Title 1"/>
+          <p:cNvSpPr>
+            <a:spLocks noGrp="1"/>
+          </p:cNvSpPr>
+          <p:nvPr>
+            <p:ph type="title"/>
           </p:nvPr>
         </p:nvSpPr>
         <p:spPr/>
@@ -6070,7 +6591,102 @@
           <a:bodyPr/>
           <a:lstStyle/>
           <a:p>
-            <a:endParaRPr lang="en-US" dirty="0"/>
+            <a:r>
+              <a:rPr lang="en-US" dirty="0" smtClean="0"/>
+              <a:t>Basics</a:t>
+            </a:r>
+            <a:endParaRPr lang="en-US" dirty="0"/>
+          </a:p>
+        </p:txBody>
+      </p:sp>
+      <p:sp>
+        <p:nvSpPr>
+          <p:cNvPr id="3" name="Content Placeholder 2"/>
+          <p:cNvSpPr>
+            <a:spLocks noGrp="1"/>
+          </p:cNvSpPr>
+          <p:nvPr>
+            <p:ph idx="1"/>
+          </p:nvPr>
+        </p:nvSpPr>
+        <p:spPr/>
+        <p:txBody>
+          <a:bodyPr/>
+          <a:lstStyle/>
+          <a:p>
+            <a:r>
+              <a:rPr lang="en-US" dirty="0" smtClean="0">
+                <a:latin typeface="Consolas" pitchFamily="49" charset="0"/>
+                <a:cs typeface="Consolas" pitchFamily="49" charset="0"/>
+              </a:rPr>
+              <a:t>data-bind</a:t>
+            </a:r>
+            <a:r>
+              <a:rPr lang="en-US" dirty="0" smtClean="0">
+                <a:cs typeface="Consolas" pitchFamily="49" charset="0"/>
+              </a:rPr>
+              <a:t> attribute</a:t>
+            </a:r>
+          </a:p>
+          <a:p>
+            <a:endParaRPr lang="en-US" dirty="0" smtClean="0">
+              <a:cs typeface="Consolas" pitchFamily="49" charset="0"/>
+            </a:endParaRPr>
+          </a:p>
+          <a:p>
+            <a:r>
+              <a:rPr lang="en-US" dirty="0" err="1" smtClean="0">
+                <a:latin typeface="Consolas" pitchFamily="49" charset="0"/>
+                <a:cs typeface="Consolas" pitchFamily="49" charset="0"/>
+              </a:rPr>
+              <a:t>ko.observable</a:t>
+            </a:r>
+            <a:r>
+              <a:rPr lang="en-US" dirty="0" smtClean="0">
+                <a:latin typeface="Consolas" pitchFamily="49" charset="0"/>
+                <a:cs typeface="Consolas" pitchFamily="49" charset="0"/>
+              </a:rPr>
+              <a:t>()</a:t>
+            </a:r>
+          </a:p>
+          <a:p>
+            <a:endParaRPr lang="en-US" dirty="0" smtClean="0">
+              <a:cs typeface="Consolas" pitchFamily="49" charset="0"/>
+            </a:endParaRPr>
+          </a:p>
+          <a:p>
+            <a:r>
+              <a:rPr lang="en-US" dirty="0" smtClean="0">
+                <a:cs typeface="Consolas" pitchFamily="49" charset="0"/>
+              </a:rPr>
+              <a:t>Subscriptions</a:t>
+            </a:r>
+          </a:p>
+          <a:p>
+            <a:endParaRPr lang="en-US" dirty="0" smtClean="0">
+              <a:latin typeface="Consolas" pitchFamily="49" charset="0"/>
+              <a:cs typeface="Consolas" pitchFamily="49" charset="0"/>
+            </a:endParaRPr>
+          </a:p>
+          <a:p>
+            <a:r>
+              <a:rPr lang="en-US" dirty="0" err="1" smtClean="0">
+                <a:latin typeface="Consolas" pitchFamily="49" charset="0"/>
+                <a:cs typeface="Consolas" pitchFamily="49" charset="0"/>
+              </a:rPr>
+              <a:t>ko.applyBindings</a:t>
+            </a:r>
+            <a:r>
+              <a:rPr lang="en-US" dirty="0" smtClean="0">
+                <a:latin typeface="Consolas" pitchFamily="49" charset="0"/>
+                <a:cs typeface="Consolas" pitchFamily="49" charset="0"/>
+              </a:rPr>
+              <a:t>()</a:t>
+            </a:r>
+            <a:endParaRPr lang="en-US" dirty="0">
+              <a:latin typeface="Consolas" pitchFamily="49" charset="0"/>
+              <a:cs typeface="Consolas" pitchFamily="49" charset="0"/>
+            </a:endParaRPr>
           </a:p>
         </p:txBody>
       </p:sp>
@@ -6081,7 +6697,7 @@
             <a:spLocks noGrp="1"/>
           </p:cNvSpPr>
           <p:nvPr>
-            <p:ph type="ftr" sz="quarter" idx="10"/>
+            <p:ph type="ftr" sz="quarter" idx="13"/>
           </p:nvPr>
         </p:nvSpPr>
         <p:spPr/>
@@ -6090,70 +6706,25 @@
           <a:lstStyle/>
           <a:p>
             <a:r>
-              <a:rPr lang="en-US" smtClean="0"/>
+              <a:rPr lang="en-US" smtClean="0">
+                <a:solidFill>
+                  <a:srgbClr val="868685"/>
+                </a:solidFill>
+              </a:rPr>
               <a:t>fast.  forward.  thinking.</a:t>
             </a:r>
-            <a:endParaRPr lang="en-US" dirty="0"/>
-          </a:p>
-        </p:txBody>
-      </p:sp>
-      <p:sp>
-        <p:nvSpPr>
-          <p:cNvPr id="2" name="Title 1"/>
-          <p:cNvSpPr>
-            <a:spLocks noGrp="1"/>
-          </p:cNvSpPr>
-          <p:nvPr>
-            <p:ph type="title"/>
-          </p:nvPr>
-        </p:nvSpPr>
-        <p:spPr/>
-        <p:txBody>
-          <a:bodyPr/>
-          <a:lstStyle/>
-          <a:p>
-            <a:r>
-              <a:rPr lang="en-US" dirty="0" smtClean="0"/>
-              <a:t>Why Knockout?</a:t>
-            </a:r>
-            <a:endParaRPr lang="en-US" dirty="0"/>
-          </a:p>
-        </p:txBody>
-      </p:sp>
-      <p:pic>
-        <p:nvPicPr>
-          <p:cNvPr id="8" name="Picture 7"/>
-          <p:cNvPicPr>
-            <a:picLocks noChangeAspect="1"/>
-          </p:cNvPicPr>
-          <p:nvPr/>
-        </p:nvPicPr>
-        <p:blipFill>
-          <a:blip r:embed="rId2">
-            <a:extLst>
-              <a:ext uri="{28A0092B-C50C-407E-A947-70E740481C1C}">
-                <a14:useLocalDpi xmlns:a14="http://schemas.microsoft.com/office/drawing/2010/main" val="0"/>
-              </a:ext>
-            </a:extLst>
-          </a:blip>
-          <a:stretch>
-            <a:fillRect/>
-          </a:stretch>
-        </p:blipFill>
-        <p:spPr>
-          <a:xfrm>
-            <a:off x="4495854" y="-57626"/>
-            <a:ext cx="4558589" cy="3637174"/>
-          </a:xfrm>
-          <a:prstGeom prst="rect">
-            <a:avLst/>
-          </a:prstGeom>
-        </p:spPr>
-      </p:pic>
+            <a:endParaRPr lang="en-US" dirty="0">
+              <a:solidFill>
+                <a:srgbClr val="868685"/>
+              </a:solidFill>
+            </a:endParaRPr>
+          </a:p>
+        </p:txBody>
+      </p:sp>
     </p:spTree>
     <p:extLst>
       <p:ext uri="{BB962C8B-B14F-4D97-AF65-F5344CB8AC3E}">
-        <p14:creationId xmlns:p14="http://schemas.microsoft.com/office/powerpoint/2010/main" val="3326783656"/>
+        <p14:creationId xmlns:p14="http://schemas.microsoft.com/office/powerpoint/2010/main" val="2427473440"/>
       </p:ext>
     </p:extLst>
   </p:cSld>
@@ -6202,10 +6773,6 @@
           <a:bodyPr/>
           <a:lstStyle/>
           <a:p>
-            <a:r>
-              <a:rPr lang="en-US" dirty="0" smtClean="0"/>
-              <a:t>Why Knockout</a:t>
-            </a:r>
             <a:endParaRPr lang="en-US" dirty="0"/>
           </a:p>
         </p:txBody>
@@ -6225,68 +6792,7 @@
           <a:bodyPr/>
           <a:lstStyle/>
           <a:p>
-            <a:pPr marL="457200" indent="-457200">
-              <a:buFont typeface="Arial" pitchFamily="34" charset="0"/>
-              <a:buChar char="•"/>
-            </a:pPr>
-            <a:r>
-              <a:rPr lang="en-US" dirty="0" smtClean="0"/>
-              <a:t>High level link between UI &amp; data model</a:t>
-            </a:r>
-          </a:p>
-          <a:p>
-            <a:pPr marL="457200" indent="-457200">
-              <a:buFont typeface="Arial" pitchFamily="34" charset="0"/>
-              <a:buChar char="•"/>
-            </a:pPr>
-            <a:r>
-              <a:rPr lang="en-US" dirty="0" smtClean="0"/>
-              <a:t>Extensible</a:t>
-            </a:r>
-          </a:p>
-          <a:p>
-            <a:pPr marL="457200" indent="-457200">
-              <a:buFont typeface="Arial" pitchFamily="34" charset="0"/>
-              <a:buChar char="•"/>
-            </a:pPr>
-            <a:r>
-              <a:rPr lang="en-US" dirty="0" smtClean="0"/>
-              <a:t>Usable in existing apps/architecture</a:t>
-            </a:r>
-          </a:p>
-          <a:p>
-            <a:pPr marL="457200" indent="-457200">
-              <a:buFont typeface="Arial" pitchFamily="34" charset="0"/>
-              <a:buChar char="•"/>
-            </a:pPr>
-            <a:r>
-              <a:rPr lang="en-US" dirty="0" smtClean="0"/>
-              <a:t>Learning Resources</a:t>
-            </a:r>
-          </a:p>
-          <a:p>
-            <a:pPr marL="457200" indent="-457200">
-              <a:buFont typeface="Arial" pitchFamily="34" charset="0"/>
-              <a:buChar char="•"/>
-            </a:pPr>
-            <a:r>
-              <a:rPr lang="en-US" dirty="0" smtClean="0"/>
-              <a:t>Same MV* pattern &amp; benefits as other solutions</a:t>
-            </a:r>
-          </a:p>
-          <a:p>
-            <a:pPr algn="ctr"/>
-            <a:r>
-              <a:rPr lang="en-US" i="1" dirty="0" smtClean="0"/>
-              <a:t>It boils down to:</a:t>
-            </a:r>
-          </a:p>
-          <a:p>
-            <a:pPr algn="ctr"/>
-            <a:r>
-              <a:rPr lang="en-US" dirty="0" smtClean="0"/>
-              <a:t>	Scope &amp; Feel</a:t>
-            </a:r>
+            <a:endParaRPr lang="en-US"/>
           </a:p>
         </p:txBody>
       </p:sp>
@@ -6306,17 +6812,25 @@
           <a:lstStyle/>
           <a:p>
             <a:r>
-              <a:rPr lang="en-US" smtClean="0"/>
+              <a:rPr lang="en-US" smtClean="0">
+                <a:solidFill>
+                  <a:srgbClr val="868685"/>
+                </a:solidFill>
+              </a:rPr>
               <a:t>fast.  forward.  thinking.</a:t>
             </a:r>
-            <a:endParaRPr lang="en-US" dirty="0"/>
+            <a:endParaRPr lang="en-US" dirty="0">
+              <a:solidFill>
+                <a:srgbClr val="868685"/>
+              </a:solidFill>
+            </a:endParaRPr>
           </a:p>
         </p:txBody>
       </p:sp>
     </p:spTree>
     <p:extLst>
       <p:ext uri="{BB962C8B-B14F-4D97-AF65-F5344CB8AC3E}">
-        <p14:creationId xmlns:p14="http://schemas.microsoft.com/office/powerpoint/2010/main" val="2407669448"/>
+        <p14:creationId xmlns:p14="http://schemas.microsoft.com/office/powerpoint/2010/main" val="1493968683"/>
       </p:ext>
     </p:extLst>
   </p:cSld>
@@ -6365,11 +6879,7 @@
           <a:bodyPr/>
           <a:lstStyle/>
           <a:p>
-            <a:r>
-              <a:rPr lang="en-US" dirty="0" smtClean="0"/>
-              <a:t>Resources</a:t>
-            </a:r>
-            <a:endParaRPr lang="en-US" dirty="0"/>
+            <a:endParaRPr lang="en-US"/>
           </a:p>
         </p:txBody>
       </p:sp>
@@ -6388,158 +6898,45 @@
           <a:bodyPr/>
           <a:lstStyle/>
           <a:p>
-            <a:pPr marL="457200" indent="-457200">
-              <a:buFont typeface="Arial" pitchFamily="34" charset="0"/>
-              <a:buChar char="•"/>
-            </a:pPr>
-            <a:r>
-              <a:rPr lang="en-US" dirty="0" smtClean="0">
-                <a:hlinkClick r:id="rId2"/>
+            <a:endParaRPr lang="en-US"/>
+          </a:p>
+        </p:txBody>
+      </p:sp>
+      <p:sp>
+        <p:nvSpPr>
+          <p:cNvPr id="4" name="Footer Placeholder 3"/>
+          <p:cNvSpPr>
+            <a:spLocks noGrp="1"/>
+          </p:cNvSpPr>
+          <p:nvPr>
+            <p:ph type="ftr" sz="quarter" idx="13"/>
+          </p:nvPr>
+        </p:nvSpPr>
+        <p:spPr/>
+        <p:txBody>
+          <a:bodyPr/>
+          <a:lstStyle/>
+          <a:p>
+            <a:r>
+              <a:rPr lang="en-US" smtClean="0">
+                <a:solidFill>
+                  <a:srgbClr val="868685"/>
+                </a:solidFill>
               </a:rPr>
-              <a:t>knockoutjs.com</a:t>
-            </a:r>
-            <a:endParaRPr lang="en-US" dirty="0" smtClean="0"/>
-          </a:p>
-          <a:p>
-            <a:pPr marL="1200150" lvl="1" indent="-457200">
-              <a:buFont typeface="Arial" pitchFamily="34" charset="0"/>
-              <a:buChar char="•"/>
-            </a:pPr>
-            <a:r>
-              <a:rPr lang="en-US" dirty="0" smtClean="0"/>
-              <a:t>Live Examples/Tutorials</a:t>
-            </a:r>
-          </a:p>
-          <a:p>
-            <a:pPr marL="1200150" lvl="1" indent="-457200">
-              <a:buFont typeface="Arial" pitchFamily="34" charset="0"/>
-              <a:buChar char="•"/>
-            </a:pPr>
-            <a:r>
-              <a:rPr lang="en-US" dirty="0" smtClean="0"/>
-              <a:t>Documentation</a:t>
-            </a:r>
-          </a:p>
-          <a:p>
-            <a:pPr marL="457200" indent="-457200">
-              <a:buFont typeface="Arial" pitchFamily="34" charset="0"/>
-              <a:buChar char="•"/>
-            </a:pPr>
-            <a:r>
-              <a:rPr lang="en-US" dirty="0">
-                <a:hlinkClick r:id="rId3"/>
-              </a:rPr>
-              <a:t>Knock Me Out </a:t>
-            </a:r>
-            <a:r>
-              <a:rPr lang="en-US" dirty="0"/>
-              <a:t>- Ryan </a:t>
-            </a:r>
-            <a:r>
-              <a:rPr lang="en-US" dirty="0" smtClean="0"/>
-              <a:t>Niemeyer’s blog</a:t>
-            </a:r>
-          </a:p>
-          <a:p>
-            <a:pPr marL="457200" indent="-457200">
-              <a:buFont typeface="Arial" pitchFamily="34" charset="0"/>
-              <a:buChar char="•"/>
-            </a:pPr>
-            <a:r>
-              <a:rPr lang="en-US" dirty="0" err="1" smtClean="0"/>
-              <a:t>PluralSight</a:t>
-            </a:r>
-            <a:r>
-              <a:rPr lang="en-US" dirty="0" smtClean="0"/>
-              <a:t> Courses</a:t>
-            </a:r>
-          </a:p>
-          <a:p>
-            <a:pPr marL="1200150" lvl="1" indent="-457200">
-              <a:buFont typeface="Arial" pitchFamily="34" charset="0"/>
-              <a:buChar char="•"/>
-            </a:pPr>
-            <a:r>
-              <a:rPr lang="en-US" dirty="0" smtClean="0">
-                <a:hlinkClick r:id="rId4"/>
-              </a:rPr>
-              <a:t>Knockout Fundamentals</a:t>
-            </a:r>
-            <a:endParaRPr lang="en-US" dirty="0" smtClean="0"/>
-          </a:p>
-          <a:p>
-            <a:pPr marL="1200150" lvl="1" indent="-457200">
-              <a:buFont typeface="Arial" pitchFamily="34" charset="0"/>
-              <a:buChar char="•"/>
-            </a:pPr>
-            <a:r>
-              <a:rPr lang="en-US" dirty="0" smtClean="0">
-                <a:hlinkClick r:id="rId5"/>
-              </a:rPr>
-              <a:t>HTML5 and JS Apps With MVVM and Knockout</a:t>
-            </a:r>
-            <a:endParaRPr lang="en-US" dirty="0" smtClean="0"/>
-          </a:p>
-          <a:p>
-            <a:pPr marL="1200150" lvl="1" indent="-457200">
-              <a:buFont typeface="Arial" pitchFamily="34" charset="0"/>
-              <a:buChar char="•"/>
-            </a:pPr>
-            <a:r>
-              <a:rPr lang="en-US" dirty="0" smtClean="0">
-                <a:hlinkClick r:id="rId6"/>
-              </a:rPr>
-              <a:t>SPAs with HTML5, </a:t>
-            </a:r>
-            <a:r>
-              <a:rPr lang="en-US" dirty="0" err="1" smtClean="0">
-                <a:hlinkClick r:id="rId6"/>
-              </a:rPr>
-              <a:t>WebAPI</a:t>
-            </a:r>
-            <a:r>
-              <a:rPr lang="en-US" dirty="0" smtClean="0">
-                <a:hlinkClick r:id="rId6"/>
-              </a:rPr>
-              <a:t>, Knockout and </a:t>
-            </a:r>
-            <a:r>
-              <a:rPr lang="en-US" dirty="0" err="1" smtClean="0">
-                <a:hlinkClick r:id="rId6"/>
-              </a:rPr>
-              <a:t>jQuery</a:t>
-            </a:r>
-            <a:endParaRPr lang="en-US" dirty="0" smtClean="0"/>
-          </a:p>
-        </p:txBody>
-      </p:sp>
-      <p:sp>
-        <p:nvSpPr>
-          <p:cNvPr id="4" name="Footer Placeholder 3"/>
-          <p:cNvSpPr>
-            <a:spLocks noGrp="1"/>
-          </p:cNvSpPr>
-          <p:nvPr>
-            <p:ph type="ftr" sz="quarter" idx="13"/>
-          </p:nvPr>
-        </p:nvSpPr>
-        <p:spPr/>
-        <p:txBody>
-          <a:bodyPr/>
-          <a:lstStyle/>
-          <a:p>
-            <a:r>
-              <a:rPr lang="en-US" smtClean="0"/>
               <a:t>fast.  forward.  thinking.</a:t>
             </a:r>
-            <a:endParaRPr lang="en-US" dirty="0"/>
+            <a:endParaRPr lang="en-US" dirty="0">
+              <a:solidFill>
+                <a:srgbClr val="868685"/>
+              </a:solidFill>
+            </a:endParaRPr>
           </a:p>
         </p:txBody>
       </p:sp>
     </p:spTree>
     <p:extLst>
       <p:ext uri="{BB962C8B-B14F-4D97-AF65-F5344CB8AC3E}">
-        <p14:creationId xmlns:p14="http://schemas.microsoft.com/office/powerpoint/2010/main" val="3856957452"/>
+        <p14:creationId xmlns:p14="http://schemas.microsoft.com/office/powerpoint/2010/main" val="4131362922"/>
       </p:ext>
     </p:extLst>
   </p:cSld>
@@ -7544,6 +7941,23 @@
 </file>
 
 <file path=customXml/item1.xml><?xml version="1.0" encoding="utf-8"?>
+<p:properties xmlns:p="http://schemas.microsoft.com/office/2006/metadata/properties" xmlns:xsi="http://www.w3.org/2001/XMLSchema-instance" xmlns:pc="http://schemas.microsoft.com/office/infopath/2007/PartnerControls">
+  <documentManagement>
+    <Notes1 xmlns="fe61190f-fd62-4882-925b-774339ad2a79">For Review</Notes1>
+  </documentManagement>
+</p:properties>
+</file>
+
+<file path=customXml/item2.xml><?xml version="1.0" encoding="utf-8"?>
+<?mso-contentType ?>
+<FormTemplates xmlns="http://schemas.microsoft.com/sharepoint/v3/contenttype/forms">
+  <Display>DocumentLibraryForm</Display>
+  <Edit>DocumentLibraryForm</Edit>
+  <New>DocumentLibraryForm</New>
+</FormTemplates>
+</file>
+
+<file path=customXml/item3.xml><?xml version="1.0" encoding="utf-8"?>
 <ct:contentTypeSchema xmlns:ct="http://schemas.microsoft.com/office/2006/metadata/contentType" xmlns:ma="http://schemas.microsoft.com/office/2006/metadata/properties/metaAttributes" ct:_="" ma:_="" ma:contentTypeName="Document" ma:contentTypeID="0x0101003F9EC9F46CDE4D4DAD559C3D47430833" ma:contentTypeVersion="1" ma:contentTypeDescription="Create a new document." ma:contentTypeScope="" ma:versionID="8f6311363f66e25fe72d6ee9f4b3cf4a">
   <xsd:schema xmlns:xsd="http://www.w3.org/2001/XMLSchema" xmlns:xs="http://www.w3.org/2001/XMLSchema" xmlns:p="http://schemas.microsoft.com/office/2006/metadata/properties" xmlns:ns2="fe61190f-fd62-4882-925b-774339ad2a79" targetNamespace="http://schemas.microsoft.com/office/2006/metadata/properties" ma:root="true" ma:fieldsID="dafab122088659ba1780d5da54696f6e" ns2:_="">
     <xsd:import namespace="fe61190f-fd62-4882-925b-774339ad2a79"/>
@@ -7671,24 +8085,31 @@
 </ct:contentTypeSchema>
 </file>
 
-<file path=customXml/item2.xml><?xml version="1.0" encoding="utf-8"?>
-<?mso-contentType ?>
-<FormTemplates xmlns="http://schemas.microsoft.com/sharepoint/v3/contenttype/forms">
-  <Display>DocumentLibraryForm</Display>
-  <Edit>DocumentLibraryForm</Edit>
-  <New>DocumentLibraryForm</New>
-</FormTemplates>
+<file path=customXml/itemProps1.xml><?xml version="1.0" encoding="utf-8"?>
+<ds:datastoreItem xmlns:ds="http://schemas.openxmlformats.org/officeDocument/2006/customXml" ds:itemID="{A2B2EFEF-C3B6-46C2-81EB-F74059C2E84A}">
+  <ds:schemaRefs>
+    <ds:schemaRef ds:uri="http://purl.org/dc/terms/"/>
+    <ds:schemaRef ds:uri="http://schemas.microsoft.com/office/infopath/2007/PartnerControls"/>
+    <ds:schemaRef ds:uri="http://schemas.microsoft.com/office/2006/documentManagement/types"/>
+    <ds:schemaRef ds:uri="http://www.w3.org/XML/1998/namespace"/>
+    <ds:schemaRef ds:uri="http://purl.org/dc/elements/1.1/"/>
+    <ds:schemaRef ds:uri="http://schemas.openxmlformats.org/package/2006/metadata/core-properties"/>
+    <ds:schemaRef ds:uri="http://schemas.microsoft.com/office/2006/metadata/properties"/>
+    <ds:schemaRef ds:uri="fe61190f-fd62-4882-925b-774339ad2a79"/>
+    <ds:schemaRef ds:uri="http://purl.org/dc/dcmitype/"/>
+  </ds:schemaRefs>
+</ds:datastoreItem>
 </file>
 
-<file path=customXml/item3.xml><?xml version="1.0" encoding="utf-8"?>
-<p:properties xmlns:p="http://schemas.microsoft.com/office/2006/metadata/properties" xmlns:xsi="http://www.w3.org/2001/XMLSchema-instance" xmlns:pc="http://schemas.microsoft.com/office/infopath/2007/PartnerControls">
-  <documentManagement>
-    <Notes1 xmlns="fe61190f-fd62-4882-925b-774339ad2a79">For Review</Notes1>
-  </documentManagement>
-</p:properties>
+<file path=customXml/itemProps2.xml><?xml version="1.0" encoding="utf-8"?>
+<ds:datastoreItem xmlns:ds="http://schemas.openxmlformats.org/officeDocument/2006/customXml" ds:itemID="{7EC616FE-D7C9-4042-A3E3-B0F466077D39}">
+  <ds:schemaRefs>
+    <ds:schemaRef ds:uri="http://schemas.microsoft.com/sharepoint/v3/contenttype/forms"/>
+  </ds:schemaRefs>
+</ds:datastoreItem>
 </file>
 
-<file path=customXml/itemProps1.xml><?xml version="1.0" encoding="utf-8"?>
+<file path=customXml/itemProps3.xml><?xml version="1.0" encoding="utf-8"?>
 <ds:datastoreItem xmlns:ds="http://schemas.openxmlformats.org/officeDocument/2006/customXml" ds:itemID="{04AFEEA5-9425-41A3-9C54-7FD95F6E07CE}">
   <ds:schemaRefs>
     <ds:schemaRef ds:uri="http://schemas.microsoft.com/office/2006/metadata/contentType"/>
@@ -7704,28 +8125,4 @@
     <ds:schemaRef ds:uri="http://schemas.microsoft.com/internal/obd"/>
   </ds:schemaRefs>
 </ds:datastoreItem>
-</file>
-
-<file path=customXml/itemProps2.xml><?xml version="1.0" encoding="utf-8"?>
-<ds:datastoreItem xmlns:ds="http://schemas.openxmlformats.org/officeDocument/2006/customXml" ds:itemID="{7EC616FE-D7C9-4042-A3E3-B0F466077D39}">
-  <ds:schemaRefs>
-    <ds:schemaRef ds:uri="http://schemas.microsoft.com/sharepoint/v3/contenttype/forms"/>
-  </ds:schemaRefs>
-</ds:datastoreItem>
-</file>
-
-<file path=customXml/itemProps3.xml><?xml version="1.0" encoding="utf-8"?>
-<ds:datastoreItem xmlns:ds="http://schemas.openxmlformats.org/officeDocument/2006/customXml" ds:itemID="{A2B2EFEF-C3B6-46C2-81EB-F74059C2E84A}">
-  <ds:schemaRefs>
-    <ds:schemaRef ds:uri="http://purl.org/dc/terms/"/>
-    <ds:schemaRef ds:uri="http://schemas.microsoft.com/office/infopath/2007/PartnerControls"/>
-    <ds:schemaRef ds:uri="http://schemas.microsoft.com/office/2006/documentManagement/types"/>
-    <ds:schemaRef ds:uri="http://www.w3.org/XML/1998/namespace"/>
-    <ds:schemaRef ds:uri="http://purl.org/dc/elements/1.1/"/>
-    <ds:schemaRef ds:uri="http://schemas.openxmlformats.org/package/2006/metadata/core-properties"/>
-    <ds:schemaRef ds:uri="http://schemas.microsoft.com/office/2006/metadata/properties"/>
-    <ds:schemaRef ds:uri="fe61190f-fd62-4882-925b-774339ad2a79"/>
-    <ds:schemaRef ds:uri="http://purl.org/dc/dcmitype/"/>
-  </ds:schemaRefs>
-</ds:datastoreItem>
 </file>
</xml_diff>

<commit_message>
debug text update, update ppt
</commit_message>
<xml_diff>
--- a/Forward Thinking KnockoutJS.pptx
+++ b/Forward Thinking KnockoutJS.pptx
@@ -5,10 +5,10 @@
     <p:sldMasterId id="2147483902" r:id="rId4"/>
   </p:sldMasterIdLst>
   <p:notesMasterIdLst>
-    <p:notesMasterId r:id="rId18"/>
+    <p:notesMasterId r:id="rId21"/>
   </p:notesMasterIdLst>
   <p:handoutMasterIdLst>
-    <p:handoutMasterId r:id="rId19"/>
+    <p:handoutMasterId r:id="rId22"/>
   </p:handoutMasterIdLst>
   <p:sldIdLst>
     <p:sldId id="275" r:id="rId5"/>
@@ -20,10 +20,13 @@
     <p:sldId id="286" r:id="rId11"/>
     <p:sldId id="287" r:id="rId12"/>
     <p:sldId id="288" r:id="rId13"/>
-    <p:sldId id="267" r:id="rId14"/>
-    <p:sldId id="283" r:id="rId15"/>
-    <p:sldId id="285" r:id="rId16"/>
-    <p:sldId id="284" r:id="rId17"/>
+    <p:sldId id="289" r:id="rId14"/>
+    <p:sldId id="291" r:id="rId15"/>
+    <p:sldId id="290" r:id="rId16"/>
+    <p:sldId id="267" r:id="rId17"/>
+    <p:sldId id="283" r:id="rId18"/>
+    <p:sldId id="285" r:id="rId19"/>
+    <p:sldId id="284" r:id="rId20"/>
   </p:sldIdLst>
   <p:sldSz cx="9144000" cy="5715000" type="screen16x10"/>
   <p:notesSz cx="6858000" cy="9144000"/>
@@ -4587,6 +4590,612 @@
       </p:grpSpPr>
       <p:sp>
         <p:nvSpPr>
+          <p:cNvPr id="2" name="Title 1"/>
+          <p:cNvSpPr>
+            <a:spLocks noGrp="1"/>
+          </p:cNvSpPr>
+          <p:nvPr>
+            <p:ph type="title"/>
+          </p:nvPr>
+        </p:nvSpPr>
+        <p:spPr/>
+        <p:txBody>
+          <a:bodyPr/>
+          <a:lstStyle/>
+          <a:p>
+            <a:r>
+              <a:rPr lang="en-US" dirty="0" smtClean="0"/>
+              <a:t>Advanced</a:t>
+            </a:r>
+            <a:endParaRPr lang="en-US" dirty="0"/>
+          </a:p>
+        </p:txBody>
+      </p:sp>
+      <p:sp>
+        <p:nvSpPr>
+          <p:cNvPr id="3" name="Content Placeholder 2"/>
+          <p:cNvSpPr>
+            <a:spLocks noGrp="1"/>
+          </p:cNvSpPr>
+          <p:nvPr>
+            <p:ph idx="1"/>
+          </p:nvPr>
+        </p:nvSpPr>
+        <p:spPr>
+          <a:xfrm>
+            <a:off x="457200" y="1072529"/>
+            <a:ext cx="8229600" cy="4032607"/>
+          </a:xfrm>
+        </p:spPr>
+        <p:txBody>
+          <a:bodyPr/>
+          <a:lstStyle/>
+          <a:p>
+            <a:r>
+              <a:rPr lang="en-US" dirty="0" err="1" smtClean="0">
+                <a:latin typeface="Consolas" pitchFamily="49" charset="0"/>
+                <a:cs typeface="Consolas" pitchFamily="49" charset="0"/>
+              </a:rPr>
+              <a:t>ko.mapping</a:t>
+            </a:r>
+            <a:endParaRPr lang="en-US" dirty="0">
+              <a:latin typeface="Consolas" pitchFamily="49" charset="0"/>
+              <a:cs typeface="Consolas" pitchFamily="49" charset="0"/>
+            </a:endParaRPr>
+          </a:p>
+          <a:p>
+            <a:r>
+              <a:rPr lang="en-US" dirty="0" err="1" smtClean="0">
+                <a:latin typeface="Consolas" pitchFamily="49" charset="0"/>
+                <a:cs typeface="Consolas" pitchFamily="49" charset="0"/>
+              </a:rPr>
+              <a:t>ko.utils</a:t>
+            </a:r>
+            <a:endParaRPr lang="en-US" dirty="0">
+              <a:latin typeface="Consolas" pitchFamily="49" charset="0"/>
+              <a:cs typeface="Consolas" pitchFamily="49" charset="0"/>
+            </a:endParaRPr>
+          </a:p>
+          <a:p>
+            <a:r>
+              <a:rPr lang="en-US" dirty="0" smtClean="0"/>
+              <a:t>Control Flow Bindings</a:t>
+            </a:r>
+          </a:p>
+          <a:p>
+            <a:pPr marL="457200" lvl="1" indent="0">
+              <a:buNone/>
+            </a:pPr>
+            <a:r>
+              <a:rPr lang="en-US" dirty="0" err="1" smtClean="0">
+                <a:latin typeface="Consolas" pitchFamily="49" charset="0"/>
+                <a:cs typeface="Consolas" pitchFamily="49" charset="0"/>
+              </a:rPr>
+              <a:t>foreach</a:t>
+            </a:r>
+            <a:endParaRPr lang="en-US" dirty="0" smtClean="0">
+              <a:latin typeface="Consolas" pitchFamily="49" charset="0"/>
+              <a:cs typeface="Consolas" pitchFamily="49" charset="0"/>
+            </a:endParaRPr>
+          </a:p>
+          <a:p>
+            <a:pPr marL="457200" lvl="1" indent="0">
+              <a:buNone/>
+            </a:pPr>
+            <a:r>
+              <a:rPr lang="en-US" dirty="0" smtClean="0">
+                <a:latin typeface="Consolas" pitchFamily="49" charset="0"/>
+                <a:cs typeface="Consolas" pitchFamily="49" charset="0"/>
+              </a:rPr>
+              <a:t>if</a:t>
+            </a:r>
+          </a:p>
+          <a:p>
+            <a:pPr marL="457200" lvl="1" indent="0">
+              <a:buNone/>
+            </a:pPr>
+            <a:r>
+              <a:rPr lang="en-US" dirty="0" smtClean="0">
+                <a:latin typeface="Consolas" pitchFamily="49" charset="0"/>
+                <a:cs typeface="Consolas" pitchFamily="49" charset="0"/>
+              </a:rPr>
+              <a:t>with</a:t>
+            </a:r>
+            <a:endParaRPr lang="en-US" dirty="0">
+              <a:latin typeface="Consolas" pitchFamily="49" charset="0"/>
+              <a:cs typeface="Consolas" pitchFamily="49" charset="0"/>
+            </a:endParaRPr>
+          </a:p>
+          <a:p>
+            <a:pPr indent="-285750"/>
+            <a:r>
+              <a:rPr lang="en-US" dirty="0" err="1" smtClean="0">
+                <a:cs typeface="Consolas" pitchFamily="49" charset="0"/>
+              </a:rPr>
+              <a:t>Containerless</a:t>
+            </a:r>
+            <a:r>
+              <a:rPr lang="en-US" dirty="0" smtClean="0">
+                <a:cs typeface="Consolas" pitchFamily="49" charset="0"/>
+              </a:rPr>
+              <a:t> Syntax</a:t>
+            </a:r>
+          </a:p>
+        </p:txBody>
+      </p:sp>
+      <p:sp>
+        <p:nvSpPr>
+          <p:cNvPr id="4" name="Footer Placeholder 3"/>
+          <p:cNvSpPr>
+            <a:spLocks noGrp="1"/>
+          </p:cNvSpPr>
+          <p:nvPr>
+            <p:ph type="ftr" sz="quarter" idx="13"/>
+          </p:nvPr>
+        </p:nvSpPr>
+        <p:spPr/>
+        <p:txBody>
+          <a:bodyPr/>
+          <a:lstStyle/>
+          <a:p>
+            <a:r>
+              <a:rPr lang="en-US" smtClean="0">
+                <a:solidFill>
+                  <a:srgbClr val="868685"/>
+                </a:solidFill>
+              </a:rPr>
+              <a:t>fast.  forward.  thinking.</a:t>
+            </a:r>
+            <a:endParaRPr lang="en-US" dirty="0">
+              <a:solidFill>
+                <a:srgbClr val="868685"/>
+              </a:solidFill>
+            </a:endParaRPr>
+          </a:p>
+        </p:txBody>
+      </p:sp>
+    </p:spTree>
+    <p:extLst>
+      <p:ext uri="{BB962C8B-B14F-4D97-AF65-F5344CB8AC3E}">
+        <p14:creationId xmlns:p14="http://schemas.microsoft.com/office/powerpoint/2010/main" val="3212993659"/>
+      </p:ext>
+    </p:extLst>
+  </p:cSld>
+  <p:clrMapOvr>
+    <a:masterClrMapping/>
+  </p:clrMapOvr>
+  <p:timing>
+    <p:tnLst>
+      <p:par>
+        <p:cTn id="1" dur="indefinite" restart="never" nodeType="tmRoot"/>
+      </p:par>
+    </p:tnLst>
+  </p:timing>
+</p:sld>
+</file>
+
+<file path=ppt/slides/slide11.xml><?xml version="1.0" encoding="utf-8"?>
+<p:sld xmlns:a="http://schemas.openxmlformats.org/drawingml/2006/main" xmlns:r="http://schemas.openxmlformats.org/officeDocument/2006/relationships" xmlns:p="http://schemas.openxmlformats.org/presentationml/2006/main">
+  <p:cSld>
+    <p:spTree>
+      <p:nvGrpSpPr>
+        <p:cNvPr id="1" name=""/>
+        <p:cNvGrpSpPr/>
+        <p:nvPr/>
+      </p:nvGrpSpPr>
+      <p:grpSpPr>
+        <a:xfrm>
+          <a:off x="0" y="0"/>
+          <a:ext cx="0" cy="0"/>
+          <a:chOff x="0" y="0"/>
+          <a:chExt cx="0" cy="0"/>
+        </a:xfrm>
+      </p:grpSpPr>
+      <p:sp>
+        <p:nvSpPr>
+          <p:cNvPr id="2" name="Title 1"/>
+          <p:cNvSpPr>
+            <a:spLocks noGrp="1"/>
+          </p:cNvSpPr>
+          <p:nvPr>
+            <p:ph type="title"/>
+          </p:nvPr>
+        </p:nvSpPr>
+        <p:spPr/>
+        <p:txBody>
+          <a:bodyPr/>
+          <a:lstStyle/>
+          <a:p>
+            <a:r>
+              <a:rPr lang="en-US" dirty="0" smtClean="0"/>
+              <a:t>Advanced</a:t>
+            </a:r>
+            <a:endParaRPr lang="en-US" dirty="0"/>
+          </a:p>
+        </p:txBody>
+      </p:sp>
+      <p:sp>
+        <p:nvSpPr>
+          <p:cNvPr id="3" name="Content Placeholder 2"/>
+          <p:cNvSpPr>
+            <a:spLocks noGrp="1"/>
+          </p:cNvSpPr>
+          <p:nvPr>
+            <p:ph idx="1"/>
+          </p:nvPr>
+        </p:nvSpPr>
+        <p:spPr>
+          <a:xfrm>
+            <a:off x="457200" y="1072529"/>
+            <a:ext cx="8229600" cy="4032607"/>
+          </a:xfrm>
+        </p:spPr>
+        <p:txBody>
+          <a:bodyPr/>
+          <a:lstStyle/>
+          <a:p>
+            <a:r>
+              <a:rPr lang="en-US" dirty="0" smtClean="0">
+                <a:cs typeface="Consolas" pitchFamily="49" charset="0"/>
+              </a:rPr>
+              <a:t>Binding Contexts</a:t>
+            </a:r>
+          </a:p>
+          <a:p>
+            <a:pPr marL="457200" lvl="1" indent="0">
+              <a:buNone/>
+            </a:pPr>
+            <a:r>
+              <a:rPr lang="en-US" dirty="0" smtClean="0">
+                <a:latin typeface="Consolas" pitchFamily="49" charset="0"/>
+                <a:cs typeface="Consolas" pitchFamily="49" charset="0"/>
+              </a:rPr>
+              <a:t>$parent</a:t>
+            </a:r>
+          </a:p>
+          <a:p>
+            <a:pPr marL="457200" lvl="1" indent="0">
+              <a:buNone/>
+            </a:pPr>
+            <a:r>
+              <a:rPr lang="en-US" dirty="0" smtClean="0">
+                <a:latin typeface="Consolas" pitchFamily="49" charset="0"/>
+                <a:cs typeface="Consolas" pitchFamily="49" charset="0"/>
+              </a:rPr>
+              <a:t>$parents</a:t>
+            </a:r>
+          </a:p>
+          <a:p>
+            <a:pPr marL="457200" lvl="1" indent="0">
+              <a:buNone/>
+            </a:pPr>
+            <a:r>
+              <a:rPr lang="en-US" dirty="0">
+                <a:latin typeface="Consolas" pitchFamily="49" charset="0"/>
+                <a:cs typeface="Consolas" pitchFamily="49" charset="0"/>
+              </a:rPr>
+              <a:t>	</a:t>
+            </a:r>
+            <a:r>
+              <a:rPr lang="en-US" dirty="0" smtClean="0">
+                <a:latin typeface="Consolas" pitchFamily="49" charset="0"/>
+                <a:cs typeface="Consolas" pitchFamily="49" charset="0"/>
+              </a:rPr>
+              <a:t>$parents[0] == $parent</a:t>
+            </a:r>
+          </a:p>
+          <a:p>
+            <a:pPr marL="457200" lvl="1" indent="0">
+              <a:buNone/>
+            </a:pPr>
+            <a:r>
+              <a:rPr lang="en-US" dirty="0">
+                <a:latin typeface="Consolas" pitchFamily="49" charset="0"/>
+                <a:cs typeface="Consolas" pitchFamily="49" charset="0"/>
+              </a:rPr>
+              <a:t>	</a:t>
+            </a:r>
+            <a:r>
+              <a:rPr lang="en-US" dirty="0" smtClean="0">
+                <a:latin typeface="Consolas" pitchFamily="49" charset="0"/>
+                <a:cs typeface="Consolas" pitchFamily="49" charset="0"/>
+              </a:rPr>
+              <a:t>$parent[1] … $parent[n]</a:t>
+            </a:r>
+          </a:p>
+          <a:p>
+            <a:pPr marL="457200" lvl="1" indent="0">
+              <a:buNone/>
+            </a:pPr>
+            <a:r>
+              <a:rPr lang="en-US" dirty="0" smtClean="0">
+                <a:latin typeface="Consolas" pitchFamily="49" charset="0"/>
+                <a:cs typeface="Consolas" pitchFamily="49" charset="0"/>
+              </a:rPr>
+              <a:t>$root</a:t>
+            </a:r>
+          </a:p>
+          <a:p>
+            <a:pPr marL="457200" lvl="1" indent="0">
+              <a:buNone/>
+            </a:pPr>
+            <a:r>
+              <a:rPr lang="en-US" dirty="0" smtClean="0">
+                <a:latin typeface="Consolas" pitchFamily="49" charset="0"/>
+                <a:cs typeface="Consolas" pitchFamily="49" charset="0"/>
+              </a:rPr>
+              <a:t>$data</a:t>
+            </a:r>
+          </a:p>
+          <a:p>
+            <a:pPr marL="457200" lvl="1" indent="0">
+              <a:buNone/>
+            </a:pPr>
+            <a:r>
+              <a:rPr lang="en-US" dirty="0" smtClean="0">
+                <a:latin typeface="Consolas" pitchFamily="49" charset="0"/>
+                <a:cs typeface="Consolas" pitchFamily="49" charset="0"/>
+              </a:rPr>
+              <a:t>$index</a:t>
+            </a:r>
+            <a:r>
+              <a:rPr lang="en-US" dirty="0" smtClean="0">
+                <a:cs typeface="Consolas" pitchFamily="49" charset="0"/>
+              </a:rPr>
+              <a:t> </a:t>
+            </a:r>
+            <a:r>
+              <a:rPr lang="en-US" dirty="0">
+                <a:cs typeface="Consolas" pitchFamily="49" charset="0"/>
+              </a:rPr>
+              <a:t>– (</a:t>
+            </a:r>
+            <a:r>
+              <a:rPr lang="en-US" dirty="0" smtClean="0">
+                <a:cs typeface="Consolas" pitchFamily="49" charset="0"/>
+              </a:rPr>
+              <a:t>only inside </a:t>
+            </a:r>
+            <a:r>
+              <a:rPr lang="en-US" dirty="0" err="1" smtClean="0">
+                <a:latin typeface="Consolas" pitchFamily="49" charset="0"/>
+                <a:cs typeface="Consolas" pitchFamily="49" charset="0"/>
+              </a:rPr>
+              <a:t>foreach</a:t>
+            </a:r>
+            <a:r>
+              <a:rPr lang="en-US" dirty="0" smtClean="0">
+                <a:cs typeface="Consolas" pitchFamily="49" charset="0"/>
+              </a:rPr>
+              <a:t>)</a:t>
+            </a:r>
+          </a:p>
+          <a:p>
+            <a:pPr marL="457200" lvl="1" indent="0">
+              <a:buNone/>
+            </a:pPr>
+            <a:r>
+              <a:rPr lang="en-US" sz="2400" dirty="0" smtClean="0">
+                <a:latin typeface="Consolas" pitchFamily="49" charset="0"/>
+                <a:cs typeface="Consolas" pitchFamily="49" charset="0"/>
+              </a:rPr>
+              <a:t>$</a:t>
+            </a:r>
+            <a:r>
+              <a:rPr lang="en-US" sz="2400" dirty="0" err="1" smtClean="0">
+                <a:latin typeface="Consolas" pitchFamily="49" charset="0"/>
+                <a:cs typeface="Consolas" pitchFamily="49" charset="0"/>
+              </a:rPr>
+              <a:t>parentContext</a:t>
+            </a:r>
+            <a:endParaRPr lang="en-US" sz="2400" dirty="0" smtClean="0">
+              <a:latin typeface="Consolas" pitchFamily="49" charset="0"/>
+              <a:cs typeface="Consolas" pitchFamily="49" charset="0"/>
+            </a:endParaRPr>
+          </a:p>
+        </p:txBody>
+      </p:sp>
+      <p:sp>
+        <p:nvSpPr>
+          <p:cNvPr id="4" name="Footer Placeholder 3"/>
+          <p:cNvSpPr>
+            <a:spLocks noGrp="1"/>
+          </p:cNvSpPr>
+          <p:nvPr>
+            <p:ph type="ftr" sz="quarter" idx="13"/>
+          </p:nvPr>
+        </p:nvSpPr>
+        <p:spPr/>
+        <p:txBody>
+          <a:bodyPr/>
+          <a:lstStyle/>
+          <a:p>
+            <a:r>
+              <a:rPr lang="en-US" smtClean="0">
+                <a:solidFill>
+                  <a:srgbClr val="868685"/>
+                </a:solidFill>
+              </a:rPr>
+              <a:t>fast.  forward.  thinking.</a:t>
+            </a:r>
+            <a:endParaRPr lang="en-US" dirty="0">
+              <a:solidFill>
+                <a:srgbClr val="868685"/>
+              </a:solidFill>
+            </a:endParaRPr>
+          </a:p>
+        </p:txBody>
+      </p:sp>
+    </p:spTree>
+    <p:extLst>
+      <p:ext uri="{BB962C8B-B14F-4D97-AF65-F5344CB8AC3E}">
+        <p14:creationId xmlns:p14="http://schemas.microsoft.com/office/powerpoint/2010/main" val="27041117"/>
+      </p:ext>
+    </p:extLst>
+  </p:cSld>
+  <p:clrMapOvr>
+    <a:masterClrMapping/>
+  </p:clrMapOvr>
+  <p:timing>
+    <p:tnLst>
+      <p:par>
+        <p:cTn id="1" dur="indefinite" restart="never" nodeType="tmRoot"/>
+      </p:par>
+    </p:tnLst>
+  </p:timing>
+</p:sld>
+</file>
+
+<file path=ppt/slides/slide12.xml><?xml version="1.0" encoding="utf-8"?>
+<p:sld xmlns:a="http://schemas.openxmlformats.org/drawingml/2006/main" xmlns:r="http://schemas.openxmlformats.org/officeDocument/2006/relationships" xmlns:p="http://schemas.openxmlformats.org/presentationml/2006/main">
+  <p:cSld>
+    <p:spTree>
+      <p:nvGrpSpPr>
+        <p:cNvPr id="1" name=""/>
+        <p:cNvGrpSpPr/>
+        <p:nvPr/>
+      </p:nvGrpSpPr>
+      <p:grpSpPr>
+        <a:xfrm>
+          <a:off x="0" y="0"/>
+          <a:ext cx="0" cy="0"/>
+          <a:chOff x="0" y="0"/>
+          <a:chExt cx="0" cy="0"/>
+        </a:xfrm>
+      </p:grpSpPr>
+      <p:sp>
+        <p:nvSpPr>
+          <p:cNvPr id="2" name="Title 1"/>
+          <p:cNvSpPr>
+            <a:spLocks noGrp="1"/>
+          </p:cNvSpPr>
+          <p:nvPr>
+            <p:ph type="title"/>
+          </p:nvPr>
+        </p:nvSpPr>
+        <p:spPr/>
+        <p:txBody>
+          <a:bodyPr/>
+          <a:lstStyle/>
+          <a:p>
+            <a:r>
+              <a:rPr lang="en-US" dirty="0" smtClean="0"/>
+              <a:t>Templates &amp; Saving Data</a:t>
+            </a:r>
+            <a:endParaRPr lang="en-US" dirty="0"/>
+          </a:p>
+        </p:txBody>
+      </p:sp>
+      <p:sp>
+        <p:nvSpPr>
+          <p:cNvPr id="3" name="Content Placeholder 2"/>
+          <p:cNvSpPr>
+            <a:spLocks noGrp="1"/>
+          </p:cNvSpPr>
+          <p:nvPr>
+            <p:ph idx="1"/>
+          </p:nvPr>
+        </p:nvSpPr>
+        <p:spPr/>
+        <p:txBody>
+          <a:bodyPr/>
+          <a:lstStyle/>
+          <a:p>
+            <a:r>
+              <a:rPr lang="en-US" dirty="0" smtClean="0">
+                <a:cs typeface="Consolas" pitchFamily="49" charset="0"/>
+              </a:rPr>
+              <a:t>Templates in Knockout</a:t>
+            </a:r>
+          </a:p>
+          <a:p>
+            <a:endParaRPr lang="en-US" dirty="0">
+              <a:cs typeface="Consolas" pitchFamily="49" charset="0"/>
+            </a:endParaRPr>
+          </a:p>
+          <a:p>
+            <a:r>
+              <a:rPr lang="en-US" dirty="0" err="1" smtClean="0">
+                <a:cs typeface="Consolas" pitchFamily="49" charset="0"/>
+              </a:rPr>
+              <a:t>ko.toJSON</a:t>
+            </a:r>
+            <a:endParaRPr lang="en-US" dirty="0" smtClean="0">
+              <a:cs typeface="Consolas" pitchFamily="49" charset="0"/>
+            </a:endParaRPr>
+          </a:p>
+        </p:txBody>
+      </p:sp>
+      <p:sp>
+        <p:nvSpPr>
+          <p:cNvPr id="4" name="Footer Placeholder 3"/>
+          <p:cNvSpPr>
+            <a:spLocks noGrp="1"/>
+          </p:cNvSpPr>
+          <p:nvPr>
+            <p:ph type="ftr" sz="quarter" idx="13"/>
+          </p:nvPr>
+        </p:nvSpPr>
+        <p:spPr/>
+        <p:txBody>
+          <a:bodyPr/>
+          <a:lstStyle/>
+          <a:p>
+            <a:r>
+              <a:rPr lang="en-US" smtClean="0">
+                <a:solidFill>
+                  <a:srgbClr val="868685"/>
+                </a:solidFill>
+              </a:rPr>
+              <a:t>fast.  forward.  thinking.</a:t>
+            </a:r>
+            <a:endParaRPr lang="en-US" dirty="0">
+              <a:solidFill>
+                <a:srgbClr val="868685"/>
+              </a:solidFill>
+            </a:endParaRPr>
+          </a:p>
+        </p:txBody>
+      </p:sp>
+    </p:spTree>
+    <p:extLst>
+      <p:ext uri="{BB962C8B-B14F-4D97-AF65-F5344CB8AC3E}">
+        <p14:creationId xmlns:p14="http://schemas.microsoft.com/office/powerpoint/2010/main" val="1359990359"/>
+      </p:ext>
+    </p:extLst>
+  </p:cSld>
+  <p:clrMapOvr>
+    <a:masterClrMapping/>
+  </p:clrMapOvr>
+  <p:timing>
+    <p:tnLst>
+      <p:par>
+        <p:cTn id="1" dur="indefinite" restart="never" nodeType="tmRoot"/>
+      </p:par>
+    </p:tnLst>
+  </p:timing>
+</p:sld>
+</file>
+
+<file path=ppt/slides/slide13.xml><?xml version="1.0" encoding="utf-8"?>
+<p:sld xmlns:a="http://schemas.openxmlformats.org/drawingml/2006/main" xmlns:r="http://schemas.openxmlformats.org/officeDocument/2006/relationships" xmlns:p="http://schemas.openxmlformats.org/presentationml/2006/main">
+  <p:cSld>
+    <p:spTree>
+      <p:nvGrpSpPr>
+        <p:cNvPr id="1" name=""/>
+        <p:cNvGrpSpPr/>
+        <p:nvPr/>
+      </p:nvGrpSpPr>
+      <p:grpSpPr>
+        <a:xfrm>
+          <a:off x="0" y="0"/>
+          <a:ext cx="0" cy="0"/>
+          <a:chOff x="0" y="0"/>
+          <a:chExt cx="0" cy="0"/>
+        </a:xfrm>
+      </p:grpSpPr>
+      <p:sp>
+        <p:nvSpPr>
           <p:cNvPr id="3" name="Text Placeholder 2"/>
           <p:cNvSpPr>
             <a:spLocks noGrp="1"/>
@@ -4700,7 +5309,7 @@
 </p:sld>
 </file>
 
-<file path=ppt/slides/slide11.xml><?xml version="1.0" encoding="utf-8"?>
+<file path=ppt/slides/slide14.xml><?xml version="1.0" encoding="utf-8"?>
 <p:sld xmlns:a="http://schemas.openxmlformats.org/drawingml/2006/main" xmlns:r="http://schemas.openxmlformats.org/officeDocument/2006/relationships" xmlns:p="http://schemas.openxmlformats.org/presentationml/2006/main">
   <p:cSld>
     <p:spTree>
@@ -4863,7 +5472,7 @@
 </p:sld>
 </file>
 
-<file path=ppt/slides/slide12.xml><?xml version="1.0" encoding="utf-8"?>
+<file path=ppt/slides/slide15.xml><?xml version="1.0" encoding="utf-8"?>
 <p:sld xmlns:a="http://schemas.openxmlformats.org/drawingml/2006/main" xmlns:r="http://schemas.openxmlformats.org/officeDocument/2006/relationships" xmlns:p="http://schemas.openxmlformats.org/presentationml/2006/main">
   <p:cSld>
     <p:spTree>
@@ -5086,7 +5695,7 @@
 </p:sld>
 </file>
 
-<file path=ppt/slides/slide13.xml><?xml version="1.0" encoding="utf-8"?>
+<file path=ppt/slides/slide16.xml><?xml version="1.0" encoding="utf-8"?>
 <p:sld xmlns:a="http://schemas.openxmlformats.org/drawingml/2006/main" xmlns:r="http://schemas.openxmlformats.org/officeDocument/2006/relationships" xmlns:p="http://schemas.openxmlformats.org/presentationml/2006/main">
   <p:cSld>
     <p:spTree>
@@ -6648,19 +7257,9 @@
               </a:rPr>
               <a:t>()</a:t>
             </a:r>
-          </a:p>
-          <a:p>
             <a:endParaRPr lang="en-US" dirty="0" smtClean="0">
               <a:cs typeface="Consolas" pitchFamily="49" charset="0"/>
             </a:endParaRPr>
-          </a:p>
-          <a:p>
-            <a:r>
-              <a:rPr lang="en-US" dirty="0" smtClean="0">
-                <a:cs typeface="Consolas" pitchFamily="49" charset="0"/>
-              </a:rPr>
-              <a:t>Subscriptions</a:t>
-            </a:r>
           </a:p>
           <a:p>
             <a:endParaRPr lang="en-US" dirty="0" smtClean="0">
@@ -6683,8 +7282,21 @@
               </a:rPr>
               <a:t>()</a:t>
             </a:r>
+          </a:p>
+          <a:p>
             <a:endParaRPr lang="en-US" dirty="0">
               <a:latin typeface="Consolas" pitchFamily="49" charset="0"/>
+              <a:cs typeface="Consolas" pitchFamily="49" charset="0"/>
+            </a:endParaRPr>
+          </a:p>
+          <a:p>
+            <a:r>
+              <a:rPr lang="en-US" dirty="0" smtClean="0">
+                <a:cs typeface="Consolas" pitchFamily="49" charset="0"/>
+              </a:rPr>
+              <a:t>Debug Text</a:t>
+            </a:r>
+            <a:endParaRPr lang="en-US" dirty="0">
               <a:cs typeface="Consolas" pitchFamily="49" charset="0"/>
             </a:endParaRPr>
           </a:p>
@@ -6773,6 +7385,10 @@
           <a:bodyPr/>
           <a:lstStyle/>
           <a:p>
+            <a:r>
+              <a:rPr lang="en-US" dirty="0" smtClean="0"/>
+              <a:t>Basics</a:t>
+            </a:r>
             <a:endParaRPr lang="en-US" dirty="0"/>
           </a:p>
         </p:txBody>
@@ -6792,7 +7408,50 @@
           <a:bodyPr/>
           <a:lstStyle/>
           <a:p>
-            <a:endParaRPr lang="en-US"/>
+            <a:r>
+              <a:rPr lang="en-US" dirty="0" err="1" smtClean="0">
+                <a:latin typeface="Consolas" pitchFamily="49" charset="0"/>
+                <a:cs typeface="Consolas" pitchFamily="49" charset="0"/>
+              </a:rPr>
+              <a:t>ko.computed</a:t>
+            </a:r>
+            <a:r>
+              <a:rPr lang="en-US" dirty="0" smtClean="0">
+                <a:latin typeface="Consolas" pitchFamily="49" charset="0"/>
+                <a:cs typeface="Consolas" pitchFamily="49" charset="0"/>
+              </a:rPr>
+              <a:t>()</a:t>
+            </a:r>
+          </a:p>
+          <a:p>
+            <a:endParaRPr lang="en-US" dirty="0" smtClean="0">
+              <a:latin typeface="Consolas" pitchFamily="49" charset="0"/>
+              <a:cs typeface="Consolas" pitchFamily="49" charset="0"/>
+            </a:endParaRPr>
+          </a:p>
+          <a:p>
+            <a:r>
+              <a:rPr lang="en-US" dirty="0" smtClean="0"/>
+              <a:t>Dependency Tracking</a:t>
+            </a:r>
+            <a:endParaRPr lang="en-US" dirty="0" smtClean="0"/>
+          </a:p>
+          <a:p>
+            <a:endParaRPr lang="en-US" dirty="0" smtClean="0"/>
+          </a:p>
+          <a:p>
+            <a:r>
+              <a:rPr lang="en-US" dirty="0" smtClean="0">
+                <a:latin typeface="Consolas" pitchFamily="49" charset="0"/>
+                <a:cs typeface="Consolas" pitchFamily="49" charset="0"/>
+              </a:rPr>
+              <a:t>visible</a:t>
+            </a:r>
+            <a:r>
+              <a:rPr lang="en-US" dirty="0" smtClean="0"/>
+              <a:t> binding</a:t>
+            </a:r>
+            <a:endParaRPr lang="en-US" dirty="0"/>
           </a:p>
         </p:txBody>
       </p:sp>
@@ -6879,7 +7538,11 @@
           <a:bodyPr/>
           <a:lstStyle/>
           <a:p>
-            <a:endParaRPr lang="en-US"/>
+            <a:r>
+              <a:rPr lang="en-US" dirty="0" smtClean="0"/>
+              <a:t>Custom Bindings</a:t>
+            </a:r>
+            <a:endParaRPr lang="en-US" dirty="0"/>
           </a:p>
         </p:txBody>
       </p:sp>
@@ -6898,7 +7561,140 @@
           <a:bodyPr/>
           <a:lstStyle/>
           <a:p>
-            <a:endParaRPr lang="en-US"/>
+            <a:r>
+              <a:rPr lang="en-US" dirty="0" err="1" smtClean="0">
+                <a:latin typeface="Consolas" pitchFamily="49" charset="0"/>
+                <a:cs typeface="Consolas" pitchFamily="49" charset="0"/>
+              </a:rPr>
+              <a:t>ko.bindingHandlers</a:t>
+            </a:r>
+            <a:endParaRPr lang="en-US" dirty="0" smtClean="0">
+              <a:latin typeface="Consolas" pitchFamily="49" charset="0"/>
+              <a:cs typeface="Consolas" pitchFamily="49" charset="0"/>
+            </a:endParaRPr>
+          </a:p>
+          <a:p>
+            <a:r>
+              <a:rPr lang="en-US" dirty="0" err="1" smtClean="0">
+                <a:latin typeface="Consolas" pitchFamily="49" charset="0"/>
+                <a:cs typeface="Consolas" pitchFamily="49" charset="0"/>
+              </a:rPr>
+              <a:t>init</a:t>
+            </a:r>
+            <a:r>
+              <a:rPr lang="en-US" dirty="0" smtClean="0"/>
+              <a:t> and </a:t>
+            </a:r>
+            <a:r>
+              <a:rPr lang="en-US" dirty="0" smtClean="0">
+                <a:latin typeface="Consolas" pitchFamily="49" charset="0"/>
+                <a:cs typeface="Consolas" pitchFamily="49" charset="0"/>
+              </a:rPr>
+              <a:t>update</a:t>
+            </a:r>
+            <a:r>
+              <a:rPr lang="en-US" dirty="0" smtClean="0"/>
+              <a:t> events</a:t>
+            </a:r>
+          </a:p>
+          <a:p>
+            <a:r>
+              <a:rPr lang="en-US" dirty="0">
+                <a:latin typeface="Consolas" pitchFamily="49" charset="0"/>
+                <a:cs typeface="Consolas" pitchFamily="49" charset="0"/>
+              </a:rPr>
+              <a:t>	</a:t>
+            </a:r>
+            <a:r>
+              <a:rPr lang="en-US" dirty="0" smtClean="0">
+                <a:latin typeface="Consolas" pitchFamily="49" charset="0"/>
+                <a:cs typeface="Consolas" pitchFamily="49" charset="0"/>
+              </a:rPr>
+              <a:t>element</a:t>
+            </a:r>
+          </a:p>
+          <a:p>
+            <a:r>
+              <a:rPr lang="en-US" dirty="0">
+                <a:latin typeface="Consolas" pitchFamily="49" charset="0"/>
+                <a:cs typeface="Consolas" pitchFamily="49" charset="0"/>
+              </a:rPr>
+              <a:t>	</a:t>
+            </a:r>
+            <a:r>
+              <a:rPr lang="en-US" dirty="0" err="1" smtClean="0">
+                <a:latin typeface="Consolas" pitchFamily="49" charset="0"/>
+                <a:cs typeface="Consolas" pitchFamily="49" charset="0"/>
+              </a:rPr>
+              <a:t>valueAccessor</a:t>
+            </a:r>
+            <a:endParaRPr lang="en-US" dirty="0" smtClean="0">
+              <a:latin typeface="Consolas" pitchFamily="49" charset="0"/>
+              <a:cs typeface="Consolas" pitchFamily="49" charset="0"/>
+            </a:endParaRPr>
+          </a:p>
+          <a:p>
+            <a:r>
+              <a:rPr lang="en-US" dirty="0" smtClean="0">
+                <a:latin typeface="Consolas" pitchFamily="49" charset="0"/>
+                <a:cs typeface="Consolas" pitchFamily="49" charset="0"/>
+              </a:rPr>
+              <a:t>	</a:t>
+            </a:r>
+            <a:r>
+              <a:rPr lang="en-US" dirty="0" err="1" smtClean="0">
+                <a:latin typeface="Consolas" pitchFamily="49" charset="0"/>
+                <a:cs typeface="Consolas" pitchFamily="49" charset="0"/>
+              </a:rPr>
+              <a:t>allBindings</a:t>
+            </a:r>
+            <a:endParaRPr lang="en-US" dirty="0" smtClean="0">
+              <a:latin typeface="Consolas" pitchFamily="49" charset="0"/>
+              <a:cs typeface="Consolas" pitchFamily="49" charset="0"/>
+            </a:endParaRPr>
+          </a:p>
+          <a:p>
+            <a:r>
+              <a:rPr lang="en-US" dirty="0">
+                <a:latin typeface="Consolas" pitchFamily="49" charset="0"/>
+                <a:cs typeface="Consolas" pitchFamily="49" charset="0"/>
+              </a:rPr>
+              <a:t>	</a:t>
+            </a:r>
+            <a:r>
+              <a:rPr lang="en-US" dirty="0" err="1" smtClean="0">
+                <a:latin typeface="Consolas" pitchFamily="49" charset="0"/>
+                <a:cs typeface="Consolas" pitchFamily="49" charset="0"/>
+              </a:rPr>
+              <a:t>viewModel</a:t>
+            </a:r>
+            <a:endParaRPr lang="en-US" dirty="0" smtClean="0">
+              <a:latin typeface="Consolas" pitchFamily="49" charset="0"/>
+              <a:cs typeface="Consolas" pitchFamily="49" charset="0"/>
+            </a:endParaRPr>
+          </a:p>
+          <a:p>
+            <a:r>
+              <a:rPr lang="en-US" dirty="0" smtClean="0">
+                <a:latin typeface="Consolas" pitchFamily="49" charset="0"/>
+                <a:cs typeface="Consolas" pitchFamily="49" charset="0"/>
+              </a:rPr>
+              <a:t>	</a:t>
+            </a:r>
+            <a:r>
+              <a:rPr lang="en-US" dirty="0" err="1" smtClean="0">
+                <a:latin typeface="Consolas" pitchFamily="49" charset="0"/>
+                <a:cs typeface="Consolas" pitchFamily="49" charset="0"/>
+              </a:rPr>
+              <a:t>bindingContext</a:t>
+            </a:r>
+            <a:endParaRPr lang="en-US" dirty="0" smtClean="0">
+              <a:latin typeface="Consolas" pitchFamily="49" charset="0"/>
+              <a:cs typeface="Consolas" pitchFamily="49" charset="0"/>
+            </a:endParaRPr>
+          </a:p>
+          <a:p>
+            <a:endParaRPr lang="en-US" dirty="0"/>
           </a:p>
         </p:txBody>
       </p:sp>

</xml_diff>

<commit_message>
Remove bullets, minor formatting
</commit_message>
<xml_diff>
--- a/Forward Thinking KnockoutJS.pptx
+++ b/Forward Thinking KnockoutJS.pptx
@@ -210,7 +210,8 @@
           <a:p>
             <a:fld id="{623B0249-1A93-E14F-BDFD-FA6558358E08}" type="datetime1">
               <a:rPr lang="en-US" smtClean="0"/>
-              <a:t>10/16/2012</a:t>
+              <a:pPr/>
+              <a:t>10/17/2012</a:t>
             </a:fld>
             <a:endParaRPr lang="en-US"/>
           </a:p>
@@ -276,6 +277,7 @@
           <a:p>
             <a:fld id="{AB824C7D-C653-3D43-B93E-B9EC9087693B}" type="slidenum">
               <a:rPr lang="en-US" smtClean="0"/>
+              <a:pPr/>
               <a:t>‹#›</a:t>
             </a:fld>
             <a:endParaRPr lang="en-US"/>
@@ -285,7 +287,7 @@
     </p:spTree>
     <p:extLst>
       <p:ext uri="{BB962C8B-B14F-4D97-AF65-F5344CB8AC3E}">
-        <p14:creationId xmlns:p14="http://schemas.microsoft.com/office/powerpoint/2010/main" val="1210170193"/>
+        <p14:creationId xmlns:p14="http://schemas.microsoft.com/office/powerpoint/2010/main" xmlns="" val="1210170193"/>
       </p:ext>
     </p:extLst>
   </p:cSld>
@@ -376,7 +378,8 @@
           <a:p>
             <a:fld id="{F8262410-3AAF-F14C-8529-8C8CC31E8003}" type="datetime1">
               <a:rPr lang="en-US" smtClean="0"/>
-              <a:t>10/16/2012</a:t>
+              <a:pPr/>
+              <a:t>10/17/2012</a:t>
             </a:fld>
             <a:endParaRPr lang="en-US"/>
           </a:p>
@@ -535,6 +538,7 @@
           <a:p>
             <a:fld id="{A084F48D-4ABE-384A-BB70-73558A1247EB}" type="slidenum">
               <a:rPr lang="en-US" smtClean="0"/>
+              <a:pPr/>
               <a:t>‹#›</a:t>
             </a:fld>
             <a:endParaRPr lang="en-US"/>
@@ -544,7 +548,7 @@
     </p:spTree>
     <p:extLst>
       <p:ext uri="{BB962C8B-B14F-4D97-AF65-F5344CB8AC3E}">
-        <p14:creationId xmlns:p14="http://schemas.microsoft.com/office/powerpoint/2010/main" val="2638976654"/>
+        <p14:creationId xmlns:p14="http://schemas.microsoft.com/office/powerpoint/2010/main" xmlns="" val="2638976654"/>
       </p:ext>
     </p:extLst>
   </p:cSld>
@@ -835,7 +839,7 @@
           <a:blip r:embed="rId2">
             <a:extLst>
               <a:ext uri="{28A0092B-C50C-407E-A947-70E740481C1C}">
-                <a14:useLocalDpi xmlns:a14="http://schemas.microsoft.com/office/drawing/2010/main" val="0"/>
+                <a14:useLocalDpi xmlns:a14="http://schemas.microsoft.com/office/drawing/2010/main" xmlns="" val="0"/>
               </a:ext>
             </a:extLst>
           </a:blip>
@@ -890,7 +894,7 @@
     </p:spTree>
     <p:extLst>
       <p:ext uri="{BB962C8B-B14F-4D97-AF65-F5344CB8AC3E}">
-        <p14:creationId xmlns:p14="http://schemas.microsoft.com/office/powerpoint/2010/main" val="4066814540"/>
+        <p14:creationId xmlns:p14="http://schemas.microsoft.com/office/powerpoint/2010/main" xmlns="" val="4066814540"/>
       </p:ext>
     </p:extLst>
   </p:cSld>
@@ -1026,6 +1030,7 @@
           <a:p>
             <a:fld id="{0145B375-9071-E041-9BDA-DEDAB072891E}" type="slidenum">
               <a:rPr lang="en-US" smtClean="0"/>
+              <a:pPr/>
               <a:t>‹#›</a:t>
             </a:fld>
             <a:endParaRPr lang="en-US"/>
@@ -1058,7 +1063,7 @@
     </p:spTree>
     <p:extLst>
       <p:ext uri="{BB962C8B-B14F-4D97-AF65-F5344CB8AC3E}">
-        <p14:creationId xmlns:p14="http://schemas.microsoft.com/office/powerpoint/2010/main" val="1663822445"/>
+        <p14:creationId xmlns:p14="http://schemas.microsoft.com/office/powerpoint/2010/main" xmlns="" val="1663822445"/>
       </p:ext>
     </p:extLst>
   </p:cSld>
@@ -1337,7 +1342,7 @@
     </p:spTree>
     <p:extLst>
       <p:ext uri="{BB962C8B-B14F-4D97-AF65-F5344CB8AC3E}">
-        <p14:creationId xmlns:p14="http://schemas.microsoft.com/office/powerpoint/2010/main" val="740844205"/>
+        <p14:creationId xmlns:p14="http://schemas.microsoft.com/office/powerpoint/2010/main" xmlns="" val="740844205"/>
       </p:ext>
     </p:extLst>
   </p:cSld>
@@ -1473,6 +1478,7 @@
           <a:p>
             <a:fld id="{0145B375-9071-E041-9BDA-DEDAB072891E}" type="slidenum">
               <a:rPr lang="en-US" smtClean="0"/>
+              <a:pPr/>
               <a:t>‹#›</a:t>
             </a:fld>
             <a:endParaRPr lang="en-US"/>
@@ -1505,7 +1511,7 @@
     </p:spTree>
     <p:extLst>
       <p:ext uri="{BB962C8B-B14F-4D97-AF65-F5344CB8AC3E}">
-        <p14:creationId xmlns:p14="http://schemas.microsoft.com/office/powerpoint/2010/main" val="1663822445"/>
+        <p14:creationId xmlns:p14="http://schemas.microsoft.com/office/powerpoint/2010/main" xmlns="" val="1663822445"/>
       </p:ext>
     </p:extLst>
   </p:cSld>
@@ -1784,7 +1790,7 @@
     </p:spTree>
     <p:extLst>
       <p:ext uri="{BB962C8B-B14F-4D97-AF65-F5344CB8AC3E}">
-        <p14:creationId xmlns:p14="http://schemas.microsoft.com/office/powerpoint/2010/main" val="740844205"/>
+        <p14:creationId xmlns:p14="http://schemas.microsoft.com/office/powerpoint/2010/main" xmlns="" val="740844205"/>
       </p:ext>
     </p:extLst>
   </p:cSld>
@@ -1920,6 +1926,7 @@
           <a:p>
             <a:fld id="{0145B375-9071-E041-9BDA-DEDAB072891E}" type="slidenum">
               <a:rPr lang="en-US" smtClean="0"/>
+              <a:pPr/>
               <a:t>‹#›</a:t>
             </a:fld>
             <a:endParaRPr lang="en-US"/>
@@ -1952,7 +1959,7 @@
     </p:spTree>
     <p:extLst>
       <p:ext uri="{BB962C8B-B14F-4D97-AF65-F5344CB8AC3E}">
-        <p14:creationId xmlns:p14="http://schemas.microsoft.com/office/powerpoint/2010/main" val="1663822445"/>
+        <p14:creationId xmlns:p14="http://schemas.microsoft.com/office/powerpoint/2010/main" xmlns="" val="1663822445"/>
       </p:ext>
     </p:extLst>
   </p:cSld>
@@ -2082,6 +2089,7 @@
           <a:p>
             <a:fld id="{0145B375-9071-E041-9BDA-DEDAB072891E}" type="slidenum">
               <a:rPr lang="en-US" smtClean="0"/>
+              <a:pPr/>
               <a:t>‹#›</a:t>
             </a:fld>
             <a:endParaRPr lang="en-US"/>
@@ -2114,7 +2122,7 @@
     </p:spTree>
     <p:extLst>
       <p:ext uri="{BB962C8B-B14F-4D97-AF65-F5344CB8AC3E}">
-        <p14:creationId xmlns:p14="http://schemas.microsoft.com/office/powerpoint/2010/main" val="3662730868"/>
+        <p14:creationId xmlns:p14="http://schemas.microsoft.com/office/powerpoint/2010/main" xmlns="" val="3662730868"/>
       </p:ext>
     </p:extLst>
   </p:cSld>
@@ -2658,7 +2666,7 @@
     </p:spTree>
     <p:extLst>
       <p:ext uri="{BB962C8B-B14F-4D97-AF65-F5344CB8AC3E}">
-        <p14:creationId xmlns:p14="http://schemas.microsoft.com/office/powerpoint/2010/main" val="4173365134"/>
+        <p14:creationId xmlns:p14="http://schemas.microsoft.com/office/powerpoint/2010/main" xmlns="" val="4173365134"/>
       </p:ext>
     </p:extLst>
   </p:cSld>
@@ -2902,6 +2910,7 @@
           <a:p>
             <a:fld id="{0145B375-9071-E041-9BDA-DEDAB072891E}" type="slidenum">
               <a:rPr lang="en-US" smtClean="0"/>
+              <a:pPr/>
               <a:t>‹#›</a:t>
             </a:fld>
             <a:endParaRPr lang="en-US"/>
@@ -2934,7 +2943,7 @@
     </p:spTree>
     <p:extLst>
       <p:ext uri="{BB962C8B-B14F-4D97-AF65-F5344CB8AC3E}">
-        <p14:creationId xmlns:p14="http://schemas.microsoft.com/office/powerpoint/2010/main" val="4075649318"/>
+        <p14:creationId xmlns:p14="http://schemas.microsoft.com/office/powerpoint/2010/main" xmlns="" val="4075649318"/>
       </p:ext>
     </p:extLst>
   </p:cSld>
@@ -3135,7 +3144,7 @@
     </p:spTree>
     <p:extLst>
       <p:ext uri="{BB962C8B-B14F-4D97-AF65-F5344CB8AC3E}">
-        <p14:creationId xmlns:p14="http://schemas.microsoft.com/office/powerpoint/2010/main" val="997721900"/>
+        <p14:creationId xmlns:p14="http://schemas.microsoft.com/office/powerpoint/2010/main" xmlns="" val="997721900"/>
       </p:ext>
     </p:extLst>
   </p:cSld>
@@ -3240,7 +3249,7 @@
     </p:spTree>
     <p:extLst>
       <p:ext uri="{BB962C8B-B14F-4D97-AF65-F5344CB8AC3E}">
-        <p14:creationId xmlns:p14="http://schemas.microsoft.com/office/powerpoint/2010/main" val="2277476416"/>
+        <p14:creationId xmlns:p14="http://schemas.microsoft.com/office/powerpoint/2010/main" xmlns="" val="2277476416"/>
       </p:ext>
     </p:extLst>
   </p:cSld>
@@ -3296,6 +3305,7 @@
           <a:p>
             <a:fld id="{0145B375-9071-E041-9BDA-DEDAB072891E}" type="slidenum">
               <a:rPr lang="en-US" smtClean="0"/>
+              <a:pPr/>
               <a:t>‹#›</a:t>
             </a:fld>
             <a:endParaRPr lang="en-US"/>
@@ -3328,7 +3338,7 @@
     </p:spTree>
     <p:extLst>
       <p:ext uri="{BB962C8B-B14F-4D97-AF65-F5344CB8AC3E}">
-        <p14:creationId xmlns:p14="http://schemas.microsoft.com/office/powerpoint/2010/main" val="3371803549"/>
+        <p14:creationId xmlns:p14="http://schemas.microsoft.com/office/powerpoint/2010/main" xmlns="" val="3371803549"/>
       </p:ext>
     </p:extLst>
   </p:cSld>
@@ -3604,7 +3614,7 @@
     </p:spTree>
     <p:extLst>
       <p:ext uri="{BB962C8B-B14F-4D97-AF65-F5344CB8AC3E}">
-        <p14:creationId xmlns:p14="http://schemas.microsoft.com/office/powerpoint/2010/main" val="19125703"/>
+        <p14:creationId xmlns:p14="http://schemas.microsoft.com/office/powerpoint/2010/main" xmlns="" val="19125703"/>
       </p:ext>
     </p:extLst>
   </p:cSld>
@@ -3883,7 +3893,7 @@
     </p:spTree>
     <p:extLst>
       <p:ext uri="{BB962C8B-B14F-4D97-AF65-F5344CB8AC3E}">
-        <p14:creationId xmlns:p14="http://schemas.microsoft.com/office/powerpoint/2010/main" val="740844205"/>
+        <p14:creationId xmlns:p14="http://schemas.microsoft.com/office/powerpoint/2010/main" xmlns="" val="740844205"/>
       </p:ext>
     </p:extLst>
   </p:cSld>
@@ -4074,7 +4084,7 @@
           <a:blip r:embed="rId16">
             <a:extLst>
               <a:ext uri="{28A0092B-C50C-407E-A947-70E740481C1C}">
-                <a14:useLocalDpi xmlns:a14="http://schemas.microsoft.com/office/drawing/2010/main" val="0"/>
+                <a14:useLocalDpi xmlns:a14="http://schemas.microsoft.com/office/drawing/2010/main" xmlns="" val="0"/>
               </a:ext>
             </a:extLst>
           </a:blip>
@@ -4136,7 +4146,7 @@
     </p:spTree>
     <p:extLst>
       <p:ext uri="{BB962C8B-B14F-4D97-AF65-F5344CB8AC3E}">
-        <p14:creationId xmlns:p14="http://schemas.microsoft.com/office/powerpoint/2010/main" val="3590015490"/>
+        <p14:creationId xmlns:p14="http://schemas.microsoft.com/office/powerpoint/2010/main" xmlns="" val="3590015490"/>
       </p:ext>
     </p:extLst>
   </p:cSld>
@@ -4554,7 +4564,7 @@
     </p:spTree>
     <p:extLst>
       <p:ext uri="{BB962C8B-B14F-4D97-AF65-F5344CB8AC3E}">
-        <p14:creationId xmlns:p14="http://schemas.microsoft.com/office/powerpoint/2010/main" val="1942200596"/>
+        <p14:creationId xmlns:p14="http://schemas.microsoft.com/office/powerpoint/2010/main" xmlns="" val="1942200596"/>
       </p:ext>
     </p:extLst>
   </p:cSld>
@@ -4729,9 +4739,6 @@
               </a:rPr>
               <a:t> Syntax</a:t>
             </a:r>
-            <a:endParaRPr lang="en-US" dirty="0" smtClean="0">
-              <a:cs typeface="Consolas" pitchFamily="49" charset="0"/>
-            </a:endParaRPr>
           </a:p>
         </p:txBody>
       </p:sp>
@@ -4769,7 +4776,7 @@
     </p:spTree>
     <p:extLst>
       <p:ext uri="{BB962C8B-B14F-4D97-AF65-F5344CB8AC3E}">
-        <p14:creationId xmlns:p14="http://schemas.microsoft.com/office/powerpoint/2010/main" val="3212993659"/>
+        <p14:creationId xmlns:p14="http://schemas.microsoft.com/office/powerpoint/2010/main" xmlns="" val="3212993659"/>
       </p:ext>
     </p:extLst>
   </p:cSld>
@@ -4924,10 +4931,6 @@
               </a:rPr>
               <a:t>$data</a:t>
             </a:r>
-            <a:endParaRPr lang="en-US" dirty="0" smtClean="0">
-              <a:latin typeface="Consolas" pitchFamily="49" charset="0"/>
-              <a:cs typeface="Consolas" pitchFamily="49" charset="0"/>
-            </a:endParaRPr>
           </a:p>
         </p:txBody>
       </p:sp>
@@ -4965,7 +4968,7 @@
     </p:spTree>
     <p:extLst>
       <p:ext uri="{BB962C8B-B14F-4D97-AF65-F5344CB8AC3E}">
-        <p14:creationId xmlns:p14="http://schemas.microsoft.com/office/powerpoint/2010/main" val="27041117"/>
+        <p14:creationId xmlns:p14="http://schemas.microsoft.com/office/powerpoint/2010/main" xmlns="" val="27041117"/>
       </p:ext>
     </p:extLst>
   </p:cSld>
@@ -5096,7 +5099,7 @@
     </p:spTree>
     <p:extLst>
       <p:ext uri="{BB962C8B-B14F-4D97-AF65-F5344CB8AC3E}">
-        <p14:creationId xmlns:p14="http://schemas.microsoft.com/office/powerpoint/2010/main" val="1359990359"/>
+        <p14:creationId xmlns:p14="http://schemas.microsoft.com/office/powerpoint/2010/main" xmlns="" val="1359990359"/>
       </p:ext>
     </p:extLst>
   </p:cSld>
@@ -5207,7 +5210,7 @@
           <a:blip r:embed="rId2">
             <a:extLst>
               <a:ext uri="{28A0092B-C50C-407E-A947-70E740481C1C}">
-                <a14:useLocalDpi xmlns:a14="http://schemas.microsoft.com/office/drawing/2010/main" val="0"/>
+                <a14:useLocalDpi xmlns:a14="http://schemas.microsoft.com/office/drawing/2010/main" xmlns="" val="0"/>
               </a:ext>
             </a:extLst>
           </a:blip>
@@ -5228,7 +5231,7 @@
     </p:spTree>
     <p:extLst>
       <p:ext uri="{BB962C8B-B14F-4D97-AF65-F5344CB8AC3E}">
-        <p14:creationId xmlns:p14="http://schemas.microsoft.com/office/powerpoint/2010/main" val="3326783656"/>
+        <p14:creationId xmlns:p14="http://schemas.microsoft.com/office/powerpoint/2010/main" xmlns="" val="3326783656"/>
       </p:ext>
     </p:extLst>
   </p:cSld>
@@ -5300,50 +5303,35 @@
           <a:bodyPr/>
           <a:lstStyle/>
           <a:p>
-            <a:pPr marL="457200" indent="-457200">
-              <a:buFont typeface="Arial" pitchFamily="34" charset="0"/>
-              <a:buChar char="•"/>
-            </a:pPr>
+            <a:pPr marL="457200" indent="-457200"/>
             <a:r>
               <a:rPr lang="en-US" dirty="0" smtClean="0"/>
               <a:t>High level link between UI &amp; data model</a:t>
             </a:r>
           </a:p>
           <a:p>
-            <a:pPr marL="457200" indent="-457200">
-              <a:buFont typeface="Arial" pitchFamily="34" charset="0"/>
-              <a:buChar char="•"/>
-            </a:pPr>
+            <a:pPr marL="457200" indent="-457200"/>
             <a:r>
               <a:rPr lang="en-US" dirty="0" smtClean="0"/>
               <a:t>Extensible</a:t>
             </a:r>
           </a:p>
           <a:p>
-            <a:pPr marL="457200" indent="-457200">
-              <a:buFont typeface="Arial" pitchFamily="34" charset="0"/>
-              <a:buChar char="•"/>
-            </a:pPr>
+            <a:pPr marL="457200" indent="-457200"/>
             <a:r>
               <a:rPr lang="en-US" dirty="0" smtClean="0"/>
               <a:t>Usable in existing apps/architecture</a:t>
             </a:r>
           </a:p>
           <a:p>
-            <a:pPr marL="457200" indent="-457200">
-              <a:buFont typeface="Arial" pitchFamily="34" charset="0"/>
-              <a:buChar char="•"/>
-            </a:pPr>
+            <a:pPr marL="457200" indent="-457200"/>
             <a:r>
               <a:rPr lang="en-US" dirty="0" smtClean="0"/>
               <a:t>Learning Resources</a:t>
             </a:r>
           </a:p>
           <a:p>
-            <a:pPr marL="457200" indent="-457200">
-              <a:buFont typeface="Arial" pitchFamily="34" charset="0"/>
-              <a:buChar char="•"/>
-            </a:pPr>
+            <a:pPr marL="457200" indent="-457200"/>
             <a:r>
               <a:rPr lang="en-US" dirty="0" smtClean="0"/>
               <a:t>Same MV* pattern &amp; benefits as other solutions</a:t>
@@ -5353,14 +5341,23 @@
             <a:pPr algn="ctr"/>
             <a:r>
               <a:rPr lang="en-US" i="1" dirty="0" smtClean="0"/>
-              <a:t>It boils down to:</a:t>
-            </a:r>
+              <a:t>It boils down </a:t>
+            </a:r>
+            <a:r>
+              <a:rPr lang="en-US" i="1" dirty="0" smtClean="0"/>
+              <a:t>to</a:t>
+            </a:r>
+            <a:endParaRPr lang="en-US" i="1" dirty="0" smtClean="0"/>
           </a:p>
           <a:p>
             <a:pPr algn="ctr"/>
             <a:r>
               <a:rPr lang="en-US" dirty="0" smtClean="0"/>
-              <a:t>	Scope &amp; Feel</a:t>
+              <a:t>Scope </a:t>
+            </a:r>
+            <a:r>
+              <a:rPr lang="en-US" dirty="0" smtClean="0"/>
+              <a:t>&amp; Feel</a:t>
             </a:r>
           </a:p>
         </p:txBody>
@@ -5391,7 +5388,7 @@
     </p:spTree>
     <p:extLst>
       <p:ext uri="{BB962C8B-B14F-4D97-AF65-F5344CB8AC3E}">
-        <p14:creationId xmlns:p14="http://schemas.microsoft.com/office/powerpoint/2010/main" val="2407669448"/>
+        <p14:creationId xmlns:p14="http://schemas.microsoft.com/office/powerpoint/2010/main" xmlns="" val="2407669448"/>
       </p:ext>
     </p:extLst>
   </p:cSld>
@@ -5463,10 +5460,7 @@
           <a:bodyPr/>
           <a:lstStyle/>
           <a:p>
-            <a:pPr marL="457200" indent="-457200">
-              <a:buFont typeface="Arial" pitchFamily="34" charset="0"/>
-              <a:buChar char="•"/>
-            </a:pPr>
+            <a:pPr marL="457200" indent="-457200"/>
             <a:r>
               <a:rPr lang="en-US" dirty="0" smtClean="0">
                 <a:hlinkClick r:id="rId2"/>
@@ -5477,8 +5471,7 @@
           </a:p>
           <a:p>
             <a:pPr marL="1200150" lvl="1" indent="-457200">
-              <a:buFont typeface="Arial" pitchFamily="34" charset="0"/>
-              <a:buChar char="•"/>
+              <a:buNone/>
             </a:pPr>
             <a:r>
               <a:rPr lang="en-US" dirty="0" smtClean="0"/>
@@ -5487,8 +5480,7 @@
           </a:p>
           <a:p>
             <a:pPr marL="1200150" lvl="1" indent="-457200">
-              <a:buFont typeface="Arial" pitchFamily="34" charset="0"/>
-              <a:buChar char="•"/>
+              <a:buNone/>
             </a:pPr>
             <a:r>
               <a:rPr lang="en-US" dirty="0" smtClean="0"/>
@@ -5496,10 +5488,7 @@
             </a:r>
           </a:p>
           <a:p>
-            <a:pPr marL="457200" indent="-457200">
-              <a:buFont typeface="Arial" pitchFamily="34" charset="0"/>
-              <a:buChar char="•"/>
-            </a:pPr>
+            <a:pPr marL="457200" indent="-457200"/>
             <a:r>
               <a:rPr lang="en-US" dirty="0">
                 <a:hlinkClick r:id="rId3"/>
@@ -5516,10 +5505,7 @@
             </a:r>
           </a:p>
           <a:p>
-            <a:pPr marL="457200" indent="-457200">
-              <a:buFont typeface="Arial" pitchFamily="34" charset="0"/>
-              <a:buChar char="•"/>
-            </a:pPr>
+            <a:pPr marL="457200" indent="-457200"/>
             <a:r>
               <a:rPr lang="en-US" dirty="0" err="1" smtClean="0"/>
               <a:t>PluralSight</a:t>
@@ -5531,8 +5517,7 @@
           </a:p>
           <a:p>
             <a:pPr marL="1200150" lvl="1" indent="-457200">
-              <a:buFont typeface="Arial" pitchFamily="34" charset="0"/>
-              <a:buChar char="•"/>
+              <a:buNone/>
             </a:pPr>
             <a:r>
               <a:rPr lang="en-US" dirty="0" smtClean="0">
@@ -5544,8 +5529,7 @@
           </a:p>
           <a:p>
             <a:pPr marL="1200150" lvl="1" indent="-457200">
-              <a:buFont typeface="Arial" pitchFamily="34" charset="0"/>
-              <a:buChar char="•"/>
+              <a:buNone/>
             </a:pPr>
             <a:r>
               <a:rPr lang="en-US" dirty="0" smtClean="0">
@@ -5557,8 +5541,7 @@
           </a:p>
           <a:p>
             <a:pPr marL="1200150" lvl="1" indent="-457200">
-              <a:buFont typeface="Arial" pitchFamily="34" charset="0"/>
-              <a:buChar char="•"/>
+              <a:buNone/>
             </a:pPr>
             <a:r>
               <a:rPr lang="en-US" dirty="0" smtClean="0">
@@ -5614,7 +5597,7 @@
     </p:spTree>
     <p:extLst>
       <p:ext uri="{BB962C8B-B14F-4D97-AF65-F5344CB8AC3E}">
-        <p14:creationId xmlns:p14="http://schemas.microsoft.com/office/powerpoint/2010/main" val="3856957452"/>
+        <p14:creationId xmlns:p14="http://schemas.microsoft.com/office/powerpoint/2010/main" xmlns="" val="3856957452"/>
       </p:ext>
     </p:extLst>
   </p:cSld>
@@ -5716,7 +5699,7 @@
     </p:spTree>
     <p:extLst>
       <p:ext uri="{BB962C8B-B14F-4D97-AF65-F5344CB8AC3E}">
-        <p14:creationId xmlns:p14="http://schemas.microsoft.com/office/powerpoint/2010/main" val="2535482467"/>
+        <p14:creationId xmlns:p14="http://schemas.microsoft.com/office/powerpoint/2010/main" xmlns="" val="2535482467"/>
       </p:ext>
     </p:extLst>
   </p:cSld>
@@ -5863,7 +5846,7 @@
     </p:spTree>
     <p:extLst>
       <p:ext uri="{BB962C8B-B14F-4D97-AF65-F5344CB8AC3E}">
-        <p14:creationId xmlns:p14="http://schemas.microsoft.com/office/powerpoint/2010/main" val="1081572735"/>
+        <p14:creationId xmlns:p14="http://schemas.microsoft.com/office/powerpoint/2010/main" xmlns="" val="1081572735"/>
       </p:ext>
     </p:extLst>
   </p:cSld>
@@ -5935,10 +5918,7 @@
           <a:bodyPr/>
           <a:lstStyle/>
           <a:p>
-            <a:pPr marL="342900" indent="-342900">
-              <a:buFont typeface="Arial" pitchFamily="34" charset="0"/>
-              <a:buChar char="•"/>
-            </a:pPr>
+            <a:pPr marL="342900" indent="-342900"/>
             <a:r>
               <a:rPr lang="en-US" dirty="0"/>
               <a:t>Client-Side MVVM </a:t>
@@ -5953,20 +5933,14 @@
             </a:r>
           </a:p>
           <a:p>
-            <a:pPr marL="342900" indent="-342900">
-              <a:buFont typeface="Arial" pitchFamily="34" charset="0"/>
-              <a:buChar char="•"/>
-            </a:pPr>
+            <a:pPr marL="342900" indent="-342900"/>
             <a:r>
               <a:rPr lang="en-US" dirty="0"/>
               <a:t>40kb (minified), 166kb (debug)</a:t>
             </a:r>
           </a:p>
           <a:p>
-            <a:pPr marL="342900" indent="-342900">
-              <a:buFont typeface="Arial" pitchFamily="34" charset="0"/>
-              <a:buChar char="•"/>
-            </a:pPr>
+            <a:pPr marL="342900" indent="-342900"/>
             <a:r>
               <a:rPr lang="en-US" dirty="0"/>
               <a:t>No </a:t>
@@ -5978,10 +5952,7 @@
             <a:endParaRPr lang="en-US" dirty="0"/>
           </a:p>
           <a:p>
-            <a:pPr marL="342900" indent="-342900">
-              <a:buFont typeface="Arial" pitchFamily="34" charset="0"/>
-              <a:buChar char="•"/>
-            </a:pPr>
+            <a:pPr marL="342900" indent="-342900"/>
             <a:r>
               <a:rPr lang="en-US" dirty="0"/>
               <a:t>Works on all mainstream browsers </a:t>
@@ -5990,8 +5961,7 @@
           </a:p>
           <a:p>
             <a:pPr marL="1085850" lvl="1" indent="-342900">
-              <a:buFont typeface="Arial" pitchFamily="34" charset="0"/>
-              <a:buChar char="•"/>
+              <a:buNone/>
             </a:pPr>
             <a:r>
               <a:rPr lang="en-US" i="1" dirty="0" smtClean="0"/>
@@ -6008,10 +5978,7 @@
             <a:endParaRPr lang="en-US" i="1" dirty="0"/>
           </a:p>
           <a:p>
-            <a:pPr marL="342900" indent="-342900">
-              <a:buFont typeface="Arial" pitchFamily="34" charset="0"/>
-              <a:buChar char="•"/>
-            </a:pPr>
+            <a:pPr marL="342900" indent="-342900"/>
             <a:r>
               <a:rPr lang="en-US" dirty="0">
                 <a:hlinkClick r:id="rId2"/>
@@ -6027,10 +5994,7 @@
             <a:endParaRPr lang="en-US" dirty="0" smtClean="0"/>
           </a:p>
           <a:p>
-            <a:pPr marL="342900" indent="-342900">
-              <a:buFont typeface="Arial" pitchFamily="34" charset="0"/>
-              <a:buChar char="•"/>
-            </a:pPr>
+            <a:pPr marL="342900" indent="-342900"/>
             <a:r>
               <a:rPr lang="en-US" dirty="0" err="1" smtClean="0"/>
               <a:t>NuGet</a:t>
@@ -6084,7 +6048,7 @@
     </p:spTree>
     <p:extLst>
       <p:ext uri="{BB962C8B-B14F-4D97-AF65-F5344CB8AC3E}">
-        <p14:creationId xmlns:p14="http://schemas.microsoft.com/office/powerpoint/2010/main" val="219216747"/>
+        <p14:creationId xmlns:p14="http://schemas.microsoft.com/office/powerpoint/2010/main" xmlns="" val="219216747"/>
       </p:ext>
     </p:extLst>
   </p:cSld>
@@ -6311,7 +6275,7 @@
     </p:spTree>
     <p:extLst>
       <p:ext uri="{BB962C8B-B14F-4D97-AF65-F5344CB8AC3E}">
-        <p14:creationId xmlns:p14="http://schemas.microsoft.com/office/powerpoint/2010/main" val="4008818627"/>
+        <p14:creationId xmlns:p14="http://schemas.microsoft.com/office/powerpoint/2010/main" xmlns="" val="4008818627"/>
       </p:ext>
     </p:extLst>
   </p:cSld>
@@ -6968,7 +6932,7 @@
     </p:spTree>
     <p:extLst>
       <p:ext uri="{BB962C8B-B14F-4D97-AF65-F5344CB8AC3E}">
-        <p14:creationId xmlns:p14="http://schemas.microsoft.com/office/powerpoint/2010/main" val="520045380"/>
+        <p14:creationId xmlns:p14="http://schemas.microsoft.com/office/powerpoint/2010/main" xmlns="" val="520045380"/>
       </p:ext>
     </p:extLst>
   </p:cSld>
@@ -7093,7 +7057,7 @@
     </p:spTree>
     <p:extLst>
       <p:ext uri="{BB962C8B-B14F-4D97-AF65-F5344CB8AC3E}">
-        <p14:creationId xmlns:p14="http://schemas.microsoft.com/office/powerpoint/2010/main" val="1518214787"/>
+        <p14:creationId xmlns:p14="http://schemas.microsoft.com/office/powerpoint/2010/main" xmlns="" val="1518214787"/>
       </p:ext>
     </p:extLst>
   </p:cSld>
@@ -7338,7 +7302,7 @@
     </p:spTree>
     <p:extLst>
       <p:ext uri="{BB962C8B-B14F-4D97-AF65-F5344CB8AC3E}">
-        <p14:creationId xmlns:p14="http://schemas.microsoft.com/office/powerpoint/2010/main" val="2427473440"/>
+        <p14:creationId xmlns:p14="http://schemas.microsoft.com/office/powerpoint/2010/main" xmlns="" val="2427473440"/>
       </p:ext>
     </p:extLst>
   </p:cSld>
@@ -7424,10 +7388,6 @@
               </a:rPr>
               <a:t> self = this;</a:t>
             </a:r>
-            <a:endParaRPr lang="en-US" dirty="0" smtClean="0">
-              <a:latin typeface="Consolas" pitchFamily="49" charset="0"/>
-              <a:cs typeface="Consolas" pitchFamily="49" charset="0"/>
-            </a:endParaRPr>
           </a:p>
           <a:p>
             <a:endParaRPr lang="en-US" dirty="0" smtClean="0">
@@ -7516,7 +7476,7 @@
     </p:spTree>
     <p:extLst>
       <p:ext uri="{BB962C8B-B14F-4D97-AF65-F5344CB8AC3E}">
-        <p14:creationId xmlns:p14="http://schemas.microsoft.com/office/powerpoint/2010/main" val="1493968683"/>
+        <p14:creationId xmlns:p14="http://schemas.microsoft.com/office/powerpoint/2010/main" xmlns="" val="1493968683"/>
       </p:ext>
     </p:extLst>
   </p:cSld>
@@ -7759,7 +7719,7 @@
     </p:spTree>
     <p:extLst>
       <p:ext uri="{BB962C8B-B14F-4D97-AF65-F5344CB8AC3E}">
-        <p14:creationId xmlns:p14="http://schemas.microsoft.com/office/powerpoint/2010/main" val="4131362922"/>
+        <p14:creationId xmlns:p14="http://schemas.microsoft.com/office/powerpoint/2010/main" xmlns="" val="4131362922"/>
       </p:ext>
     </p:extLst>
   </p:cSld>
@@ -8764,23 +8724,6 @@
 </file>
 
 <file path=customXml/item1.xml><?xml version="1.0" encoding="utf-8"?>
-<p:properties xmlns:p="http://schemas.microsoft.com/office/2006/metadata/properties" xmlns:xsi="http://www.w3.org/2001/XMLSchema-instance" xmlns:pc="http://schemas.microsoft.com/office/infopath/2007/PartnerControls">
-  <documentManagement>
-    <Notes1 xmlns="fe61190f-fd62-4882-925b-774339ad2a79">For Review</Notes1>
-  </documentManagement>
-</p:properties>
-</file>
-
-<file path=customXml/item2.xml><?xml version="1.0" encoding="utf-8"?>
-<?mso-contentType ?>
-<FormTemplates xmlns="http://schemas.microsoft.com/sharepoint/v3/contenttype/forms">
-  <Display>DocumentLibraryForm</Display>
-  <Edit>DocumentLibraryForm</Edit>
-  <New>DocumentLibraryForm</New>
-</FormTemplates>
-</file>
-
-<file path=customXml/item3.xml><?xml version="1.0" encoding="utf-8"?>
 <ct:contentTypeSchema xmlns:ct="http://schemas.microsoft.com/office/2006/metadata/contentType" xmlns:ma="http://schemas.microsoft.com/office/2006/metadata/properties/metaAttributes" ct:_="" ma:_="" ma:contentTypeName="Document" ma:contentTypeID="0x0101003F9EC9F46CDE4D4DAD559C3D47430833" ma:contentTypeVersion="1" ma:contentTypeDescription="Create a new document." ma:contentTypeScope="" ma:versionID="8f6311363f66e25fe72d6ee9f4b3cf4a">
   <xsd:schema xmlns:xsd="http://www.w3.org/2001/XMLSchema" xmlns:xs="http://www.w3.org/2001/XMLSchema" xmlns:p="http://schemas.microsoft.com/office/2006/metadata/properties" xmlns:ns2="fe61190f-fd62-4882-925b-774339ad2a79" targetNamespace="http://schemas.microsoft.com/office/2006/metadata/properties" ma:root="true" ma:fieldsID="dafab122088659ba1780d5da54696f6e" ns2:_="">
     <xsd:import namespace="fe61190f-fd62-4882-925b-774339ad2a79"/>
@@ -8908,31 +8851,24 @@
 </ct:contentTypeSchema>
 </file>
 
-<file path=customXml/itemProps1.xml><?xml version="1.0" encoding="utf-8"?>
-<ds:datastoreItem xmlns:ds="http://schemas.openxmlformats.org/officeDocument/2006/customXml" ds:itemID="{A2B2EFEF-C3B6-46C2-81EB-F74059C2E84A}">
-  <ds:schemaRefs>
-    <ds:schemaRef ds:uri="http://purl.org/dc/terms/"/>
-    <ds:schemaRef ds:uri="http://schemas.microsoft.com/office/infopath/2007/PartnerControls"/>
-    <ds:schemaRef ds:uri="http://schemas.microsoft.com/office/2006/documentManagement/types"/>
-    <ds:schemaRef ds:uri="http://www.w3.org/XML/1998/namespace"/>
-    <ds:schemaRef ds:uri="http://purl.org/dc/elements/1.1/"/>
-    <ds:schemaRef ds:uri="http://schemas.openxmlformats.org/package/2006/metadata/core-properties"/>
-    <ds:schemaRef ds:uri="http://schemas.microsoft.com/office/2006/metadata/properties"/>
-    <ds:schemaRef ds:uri="fe61190f-fd62-4882-925b-774339ad2a79"/>
-    <ds:schemaRef ds:uri="http://purl.org/dc/dcmitype/"/>
-  </ds:schemaRefs>
-</ds:datastoreItem>
+<file path=customXml/item2.xml><?xml version="1.0" encoding="utf-8"?>
+<?mso-contentType ?>
+<FormTemplates xmlns="http://schemas.microsoft.com/sharepoint/v3/contenttype/forms">
+  <Display>DocumentLibraryForm</Display>
+  <Edit>DocumentLibraryForm</Edit>
+  <New>DocumentLibraryForm</New>
+</FormTemplates>
 </file>
 
-<file path=customXml/itemProps2.xml><?xml version="1.0" encoding="utf-8"?>
-<ds:datastoreItem xmlns:ds="http://schemas.openxmlformats.org/officeDocument/2006/customXml" ds:itemID="{7EC616FE-D7C9-4042-A3E3-B0F466077D39}">
-  <ds:schemaRefs>
-    <ds:schemaRef ds:uri="http://schemas.microsoft.com/sharepoint/v3/contenttype/forms"/>
-  </ds:schemaRefs>
-</ds:datastoreItem>
+<file path=customXml/item3.xml><?xml version="1.0" encoding="utf-8"?>
+<p:properties xmlns:p="http://schemas.microsoft.com/office/2006/metadata/properties" xmlns:xsi="http://www.w3.org/2001/XMLSchema-instance" xmlns:pc="http://schemas.microsoft.com/office/infopath/2007/PartnerControls">
+  <documentManagement>
+    <Notes1 xmlns="fe61190f-fd62-4882-925b-774339ad2a79">For Review</Notes1>
+  </documentManagement>
+</p:properties>
 </file>
 
-<file path=customXml/itemProps3.xml><?xml version="1.0" encoding="utf-8"?>
+<file path=customXml/itemProps1.xml><?xml version="1.0" encoding="utf-8"?>
 <ds:datastoreItem xmlns:ds="http://schemas.openxmlformats.org/officeDocument/2006/customXml" ds:itemID="{04AFEEA5-9425-41A3-9C54-7FD95F6E07CE}">
   <ds:schemaRefs>
     <ds:schemaRef ds:uri="http://schemas.microsoft.com/office/2006/metadata/contentType"/>
@@ -8948,4 +8884,28 @@
     <ds:schemaRef ds:uri="http://schemas.microsoft.com/internal/obd"/>
   </ds:schemaRefs>
 </ds:datastoreItem>
+</file>
+
+<file path=customXml/itemProps2.xml><?xml version="1.0" encoding="utf-8"?>
+<ds:datastoreItem xmlns:ds="http://schemas.openxmlformats.org/officeDocument/2006/customXml" ds:itemID="{7EC616FE-D7C9-4042-A3E3-B0F466077D39}">
+  <ds:schemaRefs>
+    <ds:schemaRef ds:uri="http://schemas.microsoft.com/sharepoint/v3/contenttype/forms"/>
+  </ds:schemaRefs>
+</ds:datastoreItem>
+</file>
+
+<file path=customXml/itemProps3.xml><?xml version="1.0" encoding="utf-8"?>
+<ds:datastoreItem xmlns:ds="http://schemas.openxmlformats.org/officeDocument/2006/customXml" ds:itemID="{A2B2EFEF-C3B6-46C2-81EB-F74059C2E84A}">
+  <ds:schemaRefs>
+    <ds:schemaRef ds:uri="http://purl.org/dc/terms/"/>
+    <ds:schemaRef ds:uri="http://schemas.microsoft.com/office/infopath/2007/PartnerControls"/>
+    <ds:schemaRef ds:uri="http://schemas.microsoft.com/office/2006/documentManagement/types"/>
+    <ds:schemaRef ds:uri="http://www.w3.org/XML/1998/namespace"/>
+    <ds:schemaRef ds:uri="http://purl.org/dc/elements/1.1/"/>
+    <ds:schemaRef ds:uri="http://schemas.openxmlformats.org/package/2006/metadata/core-properties"/>
+    <ds:schemaRef ds:uri="http://schemas.microsoft.com/office/2006/metadata/properties"/>
+    <ds:schemaRef ds:uri="fe61190f-fd62-4882-925b-774339ad2a79"/>
+    <ds:schemaRef ds:uri="http://purl.org/dc/dcmitype/"/>
+  </ds:schemaRefs>
+</ds:datastoreItem>
 </file>
</xml_diff>